<commit_message>
updated index and ppt
</commit_message>
<xml_diff>
--- a/August 2018.pptx
+++ b/August 2018.pptx
@@ -4,9 +4,16 @@
   <p:sldMasterIdLst>
     <p:sldMasterId id="2147483689" r:id="rId1"/>
   </p:sldMasterIdLst>
+  <p:notesMasterIdLst>
+    <p:notesMasterId r:id="rId8"/>
+  </p:notesMasterIdLst>
   <p:sldIdLst>
     <p:sldId id="256" r:id="rId2"/>
     <p:sldId id="257" r:id="rId3"/>
+    <p:sldId id="258" r:id="rId4"/>
+    <p:sldId id="259" r:id="rId5"/>
+    <p:sldId id="260" r:id="rId6"/>
+    <p:sldId id="261" r:id="rId7"/>
   </p:sldIdLst>
   <p:sldSz cx="12192000" cy="6858000"/>
   <p:notesSz cx="6858000" cy="9144000"/>
@@ -105,7 +112,1025 @@
       </a:defRPr>
     </a:lvl9pPr>
   </p:defaultTextStyle>
+  <p:extLst>
+    <p:ext uri="{EFAFB233-063F-42B5-8137-9DF3F51BA10A}">
+      <p15:sldGuideLst xmlns:p15="http://schemas.microsoft.com/office/powerpoint/2012/main"/>
+    </p:ext>
+  </p:extLst>
 </p:presentation>
+</file>
+
+<file path=ppt/notesMasters/notesMaster1.xml><?xml version="1.0" encoding="utf-8"?>
+<p:notesMaster xmlns:a="http://schemas.openxmlformats.org/drawingml/2006/main" xmlns:r="http://schemas.openxmlformats.org/officeDocument/2006/relationships" xmlns:p="http://schemas.openxmlformats.org/presentationml/2006/main">
+  <p:cSld>
+    <p:bg>
+      <p:bgRef idx="1001">
+        <a:schemeClr val="bg1"/>
+      </p:bgRef>
+    </p:bg>
+    <p:spTree>
+      <p:nvGrpSpPr>
+        <p:cNvPr id="1" name=""/>
+        <p:cNvGrpSpPr/>
+        <p:nvPr/>
+      </p:nvGrpSpPr>
+      <p:grpSpPr>
+        <a:xfrm>
+          <a:off x="0" y="0"/>
+          <a:ext cx="0" cy="0"/>
+          <a:chOff x="0" y="0"/>
+          <a:chExt cx="0" cy="0"/>
+        </a:xfrm>
+      </p:grpSpPr>
+      <p:sp>
+        <p:nvSpPr>
+          <p:cNvPr id="2" name="Header Placeholder 1"/>
+          <p:cNvSpPr>
+            <a:spLocks noGrp="1"/>
+          </p:cNvSpPr>
+          <p:nvPr>
+            <p:ph type="hdr" sz="quarter"/>
+          </p:nvPr>
+        </p:nvSpPr>
+        <p:spPr>
+          <a:xfrm>
+            <a:off x="0" y="0"/>
+            <a:ext cx="2971800" cy="458788"/>
+          </a:xfrm>
+          <a:prstGeom prst="rect">
+            <a:avLst/>
+          </a:prstGeom>
+        </p:spPr>
+        <p:txBody>
+          <a:bodyPr vert="horz" lIns="91440" tIns="45720" rIns="91440" bIns="45720" rtlCol="0"/>
+          <a:lstStyle>
+            <a:lvl1pPr algn="l">
+              <a:defRPr sz="1200"/>
+            </a:lvl1pPr>
+          </a:lstStyle>
+          <a:p>
+            <a:endParaRPr lang="en-US"/>
+          </a:p>
+        </p:txBody>
+      </p:sp>
+      <p:sp>
+        <p:nvSpPr>
+          <p:cNvPr id="3" name="Date Placeholder 2"/>
+          <p:cNvSpPr>
+            <a:spLocks noGrp="1"/>
+          </p:cNvSpPr>
+          <p:nvPr>
+            <p:ph type="dt" idx="1"/>
+          </p:nvPr>
+        </p:nvSpPr>
+        <p:spPr>
+          <a:xfrm>
+            <a:off x="3884613" y="0"/>
+            <a:ext cx="2971800" cy="458788"/>
+          </a:xfrm>
+          <a:prstGeom prst="rect">
+            <a:avLst/>
+          </a:prstGeom>
+        </p:spPr>
+        <p:txBody>
+          <a:bodyPr vert="horz" lIns="91440" tIns="45720" rIns="91440" bIns="45720" rtlCol="0"/>
+          <a:lstStyle>
+            <a:lvl1pPr algn="r">
+              <a:defRPr sz="1200"/>
+            </a:lvl1pPr>
+          </a:lstStyle>
+          <a:p>
+            <a:fld id="{46609D4D-7D39-4F2B-9313-3332C0AD795B}" type="datetimeFigureOut">
+              <a:rPr lang="en-US" smtClean="0"/>
+              <a:t>4/15/2024</a:t>
+            </a:fld>
+            <a:endParaRPr lang="en-US"/>
+          </a:p>
+        </p:txBody>
+      </p:sp>
+      <p:sp>
+        <p:nvSpPr>
+          <p:cNvPr id="4" name="Slide Image Placeholder 3"/>
+          <p:cNvSpPr>
+            <a:spLocks noGrp="1" noRot="1" noChangeAspect="1"/>
+          </p:cNvSpPr>
+          <p:nvPr>
+            <p:ph type="sldImg" idx="2"/>
+          </p:nvPr>
+        </p:nvSpPr>
+        <p:spPr>
+          <a:xfrm>
+            <a:off x="685800" y="1143000"/>
+            <a:ext cx="5486400" cy="3086100"/>
+          </a:xfrm>
+          <a:prstGeom prst="rect">
+            <a:avLst/>
+          </a:prstGeom>
+          <a:noFill/>
+          <a:ln w="12700">
+            <a:solidFill>
+              <a:prstClr val="black"/>
+            </a:solidFill>
+          </a:ln>
+        </p:spPr>
+        <p:txBody>
+          <a:bodyPr vert="horz" lIns="91440" tIns="45720" rIns="91440" bIns="45720" rtlCol="0" anchor="ctr"/>
+          <a:lstStyle/>
+          <a:p>
+            <a:endParaRPr lang="en-US"/>
+          </a:p>
+        </p:txBody>
+      </p:sp>
+      <p:sp>
+        <p:nvSpPr>
+          <p:cNvPr id="5" name="Notes Placeholder 4"/>
+          <p:cNvSpPr>
+            <a:spLocks noGrp="1"/>
+          </p:cNvSpPr>
+          <p:nvPr>
+            <p:ph type="body" sz="quarter" idx="3"/>
+          </p:nvPr>
+        </p:nvSpPr>
+        <p:spPr>
+          <a:xfrm>
+            <a:off x="685800" y="4400550"/>
+            <a:ext cx="5486400" cy="3600450"/>
+          </a:xfrm>
+          <a:prstGeom prst="rect">
+            <a:avLst/>
+          </a:prstGeom>
+        </p:spPr>
+        <p:txBody>
+          <a:bodyPr vert="horz" lIns="91440" tIns="45720" rIns="91440" bIns="45720" rtlCol="0"/>
+          <a:lstStyle/>
+          <a:p>
+            <a:pPr lvl="0"/>
+            <a:r>
+              <a:rPr lang="en-US"/>
+              <a:t>Click to edit Master text styles</a:t>
+            </a:r>
+          </a:p>
+          <a:p>
+            <a:pPr lvl="1"/>
+            <a:r>
+              <a:rPr lang="en-US"/>
+              <a:t>Second level</a:t>
+            </a:r>
+          </a:p>
+          <a:p>
+            <a:pPr lvl="2"/>
+            <a:r>
+              <a:rPr lang="en-US"/>
+              <a:t>Third level</a:t>
+            </a:r>
+          </a:p>
+          <a:p>
+            <a:pPr lvl="3"/>
+            <a:r>
+              <a:rPr lang="en-US"/>
+              <a:t>Fourth level</a:t>
+            </a:r>
+          </a:p>
+          <a:p>
+            <a:pPr lvl="4"/>
+            <a:r>
+              <a:rPr lang="en-US"/>
+              <a:t>Fifth level</a:t>
+            </a:r>
+          </a:p>
+        </p:txBody>
+      </p:sp>
+      <p:sp>
+        <p:nvSpPr>
+          <p:cNvPr id="6" name="Footer Placeholder 5"/>
+          <p:cNvSpPr>
+            <a:spLocks noGrp="1"/>
+          </p:cNvSpPr>
+          <p:nvPr>
+            <p:ph type="ftr" sz="quarter" idx="4"/>
+          </p:nvPr>
+        </p:nvSpPr>
+        <p:spPr>
+          <a:xfrm>
+            <a:off x="0" y="8685213"/>
+            <a:ext cx="2971800" cy="458787"/>
+          </a:xfrm>
+          <a:prstGeom prst="rect">
+            <a:avLst/>
+          </a:prstGeom>
+        </p:spPr>
+        <p:txBody>
+          <a:bodyPr vert="horz" lIns="91440" tIns="45720" rIns="91440" bIns="45720" rtlCol="0" anchor="b"/>
+          <a:lstStyle>
+            <a:lvl1pPr algn="l">
+              <a:defRPr sz="1200"/>
+            </a:lvl1pPr>
+          </a:lstStyle>
+          <a:p>
+            <a:endParaRPr lang="en-US"/>
+          </a:p>
+        </p:txBody>
+      </p:sp>
+      <p:sp>
+        <p:nvSpPr>
+          <p:cNvPr id="7" name="Slide Number Placeholder 6"/>
+          <p:cNvSpPr>
+            <a:spLocks noGrp="1"/>
+          </p:cNvSpPr>
+          <p:nvPr>
+            <p:ph type="sldNum" sz="quarter" idx="5"/>
+          </p:nvPr>
+        </p:nvSpPr>
+        <p:spPr>
+          <a:xfrm>
+            <a:off x="3884613" y="8685213"/>
+            <a:ext cx="2971800" cy="458787"/>
+          </a:xfrm>
+          <a:prstGeom prst="rect">
+            <a:avLst/>
+          </a:prstGeom>
+        </p:spPr>
+        <p:txBody>
+          <a:bodyPr vert="horz" lIns="91440" tIns="45720" rIns="91440" bIns="45720" rtlCol="0" anchor="b"/>
+          <a:lstStyle>
+            <a:lvl1pPr algn="r">
+              <a:defRPr sz="1200"/>
+            </a:lvl1pPr>
+          </a:lstStyle>
+          <a:p>
+            <a:fld id="{2A82BF32-25B9-4CFB-82AF-946389DD5021}" type="slidenum">
+              <a:rPr lang="en-US" smtClean="0"/>
+              <a:t>‹#›</a:t>
+            </a:fld>
+            <a:endParaRPr lang="en-US"/>
+          </a:p>
+        </p:txBody>
+      </p:sp>
+    </p:spTree>
+    <p:extLst>
+      <p:ext uri="{BB962C8B-B14F-4D97-AF65-F5344CB8AC3E}">
+        <p14:creationId xmlns:p14="http://schemas.microsoft.com/office/powerpoint/2010/main" val="2683412721"/>
+      </p:ext>
+    </p:extLst>
+  </p:cSld>
+  <p:clrMap bg1="lt1" tx1="dk1" bg2="lt2" tx2="dk2" accent1="accent1" accent2="accent2" accent3="accent3" accent4="accent4" accent5="accent5" accent6="accent6" hlink="hlink" folHlink="folHlink"/>
+  <p:notesStyle>
+    <a:lvl1pPr marL="0" algn="l" defTabSz="914400" rtl="0" eaLnBrk="1" latinLnBrk="0" hangingPunct="1">
+      <a:defRPr sz="1200" kern="1200">
+        <a:solidFill>
+          <a:schemeClr val="tx1"/>
+        </a:solidFill>
+        <a:latin typeface="+mn-lt"/>
+        <a:ea typeface="+mn-ea"/>
+        <a:cs typeface="+mn-cs"/>
+      </a:defRPr>
+    </a:lvl1pPr>
+    <a:lvl2pPr marL="457200" algn="l" defTabSz="914400" rtl="0" eaLnBrk="1" latinLnBrk="0" hangingPunct="1">
+      <a:defRPr sz="1200" kern="1200">
+        <a:solidFill>
+          <a:schemeClr val="tx1"/>
+        </a:solidFill>
+        <a:latin typeface="+mn-lt"/>
+        <a:ea typeface="+mn-ea"/>
+        <a:cs typeface="+mn-cs"/>
+      </a:defRPr>
+    </a:lvl2pPr>
+    <a:lvl3pPr marL="914400" algn="l" defTabSz="914400" rtl="0" eaLnBrk="1" latinLnBrk="0" hangingPunct="1">
+      <a:defRPr sz="1200" kern="1200">
+        <a:solidFill>
+          <a:schemeClr val="tx1"/>
+        </a:solidFill>
+        <a:latin typeface="+mn-lt"/>
+        <a:ea typeface="+mn-ea"/>
+        <a:cs typeface="+mn-cs"/>
+      </a:defRPr>
+    </a:lvl3pPr>
+    <a:lvl4pPr marL="1371600" algn="l" defTabSz="914400" rtl="0" eaLnBrk="1" latinLnBrk="0" hangingPunct="1">
+      <a:defRPr sz="1200" kern="1200">
+        <a:solidFill>
+          <a:schemeClr val="tx1"/>
+        </a:solidFill>
+        <a:latin typeface="+mn-lt"/>
+        <a:ea typeface="+mn-ea"/>
+        <a:cs typeface="+mn-cs"/>
+      </a:defRPr>
+    </a:lvl4pPr>
+    <a:lvl5pPr marL="1828800" algn="l" defTabSz="914400" rtl="0" eaLnBrk="1" latinLnBrk="0" hangingPunct="1">
+      <a:defRPr sz="1200" kern="1200">
+        <a:solidFill>
+          <a:schemeClr val="tx1"/>
+        </a:solidFill>
+        <a:latin typeface="+mn-lt"/>
+        <a:ea typeface="+mn-ea"/>
+        <a:cs typeface="+mn-cs"/>
+      </a:defRPr>
+    </a:lvl5pPr>
+    <a:lvl6pPr marL="2286000" algn="l" defTabSz="914400" rtl="0" eaLnBrk="1" latinLnBrk="0" hangingPunct="1">
+      <a:defRPr sz="1200" kern="1200">
+        <a:solidFill>
+          <a:schemeClr val="tx1"/>
+        </a:solidFill>
+        <a:latin typeface="+mn-lt"/>
+        <a:ea typeface="+mn-ea"/>
+        <a:cs typeface="+mn-cs"/>
+      </a:defRPr>
+    </a:lvl6pPr>
+    <a:lvl7pPr marL="2743200" algn="l" defTabSz="914400" rtl="0" eaLnBrk="1" latinLnBrk="0" hangingPunct="1">
+      <a:defRPr sz="1200" kern="1200">
+        <a:solidFill>
+          <a:schemeClr val="tx1"/>
+        </a:solidFill>
+        <a:latin typeface="+mn-lt"/>
+        <a:ea typeface="+mn-ea"/>
+        <a:cs typeface="+mn-cs"/>
+      </a:defRPr>
+    </a:lvl7pPr>
+    <a:lvl8pPr marL="3200400" algn="l" defTabSz="914400" rtl="0" eaLnBrk="1" latinLnBrk="0" hangingPunct="1">
+      <a:defRPr sz="1200" kern="1200">
+        <a:solidFill>
+          <a:schemeClr val="tx1"/>
+        </a:solidFill>
+        <a:latin typeface="+mn-lt"/>
+        <a:ea typeface="+mn-ea"/>
+        <a:cs typeface="+mn-cs"/>
+      </a:defRPr>
+    </a:lvl8pPr>
+    <a:lvl9pPr marL="3657600" algn="l" defTabSz="914400" rtl="0" eaLnBrk="1" latinLnBrk="0" hangingPunct="1">
+      <a:defRPr sz="1200" kern="1200">
+        <a:solidFill>
+          <a:schemeClr val="tx1"/>
+        </a:solidFill>
+        <a:latin typeface="+mn-lt"/>
+        <a:ea typeface="+mn-ea"/>
+        <a:cs typeface="+mn-cs"/>
+      </a:defRPr>
+    </a:lvl9pPr>
+  </p:notesStyle>
+</p:notesMaster>
+</file>
+
+<file path=ppt/notesSlides/notesSlide1.xml><?xml version="1.0" encoding="utf-8"?>
+<p:notes xmlns:a="http://schemas.openxmlformats.org/drawingml/2006/main" xmlns:r="http://schemas.openxmlformats.org/officeDocument/2006/relationships" xmlns:p="http://schemas.openxmlformats.org/presentationml/2006/main">
+  <p:cSld>
+    <p:spTree>
+      <p:nvGrpSpPr>
+        <p:cNvPr id="1" name=""/>
+        <p:cNvGrpSpPr/>
+        <p:nvPr/>
+      </p:nvGrpSpPr>
+      <p:grpSpPr>
+        <a:xfrm>
+          <a:off x="0" y="0"/>
+          <a:ext cx="0" cy="0"/>
+          <a:chOff x="0" y="0"/>
+          <a:chExt cx="0" cy="0"/>
+        </a:xfrm>
+      </p:grpSpPr>
+      <p:sp>
+        <p:nvSpPr>
+          <p:cNvPr id="2" name="Slide Image Placeholder 1"/>
+          <p:cNvSpPr>
+            <a:spLocks noGrp="1" noRot="1" noChangeAspect="1"/>
+          </p:cNvSpPr>
+          <p:nvPr>
+            <p:ph type="sldImg"/>
+          </p:nvPr>
+        </p:nvSpPr>
+        <p:spPr/>
+      </p:sp>
+      <p:sp>
+        <p:nvSpPr>
+          <p:cNvPr id="3" name="Notes Placeholder 2"/>
+          <p:cNvSpPr>
+            <a:spLocks noGrp="1"/>
+          </p:cNvSpPr>
+          <p:nvPr>
+            <p:ph type="body" idx="1"/>
+          </p:nvPr>
+        </p:nvSpPr>
+        <p:spPr/>
+        <p:txBody>
+          <a:bodyPr/>
+          <a:lstStyle/>
+          <a:p>
+            <a:r>
+              <a:rPr lang="en-US" dirty="0"/>
+              <a:t>We learned the split function in class but it was fun to actually apply it.  Started with just Code and Description, eventually deleted the columns that were no longer needed.</a:t>
+            </a:r>
+          </a:p>
+        </p:txBody>
+      </p:sp>
+      <p:sp>
+        <p:nvSpPr>
+          <p:cNvPr id="4" name="Slide Number Placeholder 3"/>
+          <p:cNvSpPr>
+            <a:spLocks noGrp="1"/>
+          </p:cNvSpPr>
+          <p:nvPr>
+            <p:ph type="sldNum" sz="quarter" idx="5"/>
+          </p:nvPr>
+        </p:nvSpPr>
+        <p:spPr/>
+        <p:txBody>
+          <a:bodyPr/>
+          <a:lstStyle/>
+          <a:p>
+            <a:fld id="{2A82BF32-25B9-4CFB-82AF-946389DD5021}" type="slidenum">
+              <a:rPr lang="en-US" smtClean="0"/>
+              <a:t>3</a:t>
+            </a:fld>
+            <a:endParaRPr lang="en-US"/>
+          </a:p>
+        </p:txBody>
+      </p:sp>
+    </p:spTree>
+    <p:extLst>
+      <p:ext uri="{BB962C8B-B14F-4D97-AF65-F5344CB8AC3E}">
+        <p14:creationId xmlns:p14="http://schemas.microsoft.com/office/powerpoint/2010/main" val="49893993"/>
+      </p:ext>
+    </p:extLst>
+  </p:cSld>
+  <p:clrMapOvr>
+    <a:masterClrMapping/>
+  </p:clrMapOvr>
+</p:notes>
+</file>
+
+<file path=ppt/notesSlides/notesSlide2.xml><?xml version="1.0" encoding="utf-8"?>
+<p:notes xmlns:a="http://schemas.openxmlformats.org/drawingml/2006/main" xmlns:r="http://schemas.openxmlformats.org/officeDocument/2006/relationships" xmlns:p="http://schemas.openxmlformats.org/presentationml/2006/main">
+  <p:cSld>
+    <p:spTree>
+      <p:nvGrpSpPr>
+        <p:cNvPr id="1" name=""/>
+        <p:cNvGrpSpPr/>
+        <p:nvPr/>
+      </p:nvGrpSpPr>
+      <p:grpSpPr>
+        <a:xfrm>
+          <a:off x="0" y="0"/>
+          <a:ext cx="0" cy="0"/>
+          <a:chOff x="0" y="0"/>
+          <a:chExt cx="0" cy="0"/>
+        </a:xfrm>
+      </p:grpSpPr>
+      <p:sp>
+        <p:nvSpPr>
+          <p:cNvPr id="2" name="Slide Image Placeholder 1"/>
+          <p:cNvSpPr>
+            <a:spLocks noGrp="1" noRot="1" noChangeAspect="1"/>
+          </p:cNvSpPr>
+          <p:nvPr>
+            <p:ph type="sldImg"/>
+          </p:nvPr>
+        </p:nvSpPr>
+        <p:spPr/>
+      </p:sp>
+      <p:sp>
+        <p:nvSpPr>
+          <p:cNvPr id="3" name="Notes Placeholder 2"/>
+          <p:cNvSpPr>
+            <a:spLocks noGrp="1"/>
+          </p:cNvSpPr>
+          <p:nvPr>
+            <p:ph type="body" idx="1"/>
+          </p:nvPr>
+        </p:nvSpPr>
+        <p:spPr/>
+        <p:txBody>
+          <a:bodyPr/>
+          <a:lstStyle/>
+          <a:p>
+            <a:r>
+              <a:rPr lang="en-US" dirty="0"/>
+              <a:t> </a:t>
+            </a:r>
+            <a:r>
+              <a:rPr lang="en-US" dirty="0" err="1"/>
+              <a:t>columns.str.lower</a:t>
+            </a:r>
+            <a:r>
+              <a:rPr lang="en-US" dirty="0"/>
+              <a:t> was a quick, easy way to change all the column headers to lower case rather than rename everything</a:t>
+            </a:r>
+          </a:p>
+          <a:p>
+            <a:r>
+              <a:rPr lang="en-US" dirty="0"/>
+              <a:t>We wanted to keep the index as it was useful as a primary key, but we needed a column header.  Index.name allowed us to add that.</a:t>
+            </a:r>
+          </a:p>
+        </p:txBody>
+      </p:sp>
+      <p:sp>
+        <p:nvSpPr>
+          <p:cNvPr id="4" name="Slide Number Placeholder 3"/>
+          <p:cNvSpPr>
+            <a:spLocks noGrp="1"/>
+          </p:cNvSpPr>
+          <p:nvPr>
+            <p:ph type="sldNum" sz="quarter" idx="5"/>
+          </p:nvPr>
+        </p:nvSpPr>
+        <p:spPr/>
+        <p:txBody>
+          <a:bodyPr/>
+          <a:lstStyle/>
+          <a:p>
+            <a:fld id="{2A82BF32-25B9-4CFB-82AF-946389DD5021}" type="slidenum">
+              <a:rPr lang="en-US" smtClean="0"/>
+              <a:t>4</a:t>
+            </a:fld>
+            <a:endParaRPr lang="en-US"/>
+          </a:p>
+        </p:txBody>
+      </p:sp>
+    </p:spTree>
+    <p:extLst>
+      <p:ext uri="{BB962C8B-B14F-4D97-AF65-F5344CB8AC3E}">
+        <p14:creationId xmlns:p14="http://schemas.microsoft.com/office/powerpoint/2010/main" val="3731497154"/>
+      </p:ext>
+    </p:extLst>
+  </p:cSld>
+  <p:clrMapOvr>
+    <a:masterClrMapping/>
+  </p:clrMapOvr>
+</p:notes>
+</file>
+
+<file path=ppt/notesSlides/notesSlide3.xml><?xml version="1.0" encoding="utf-8"?>
+<p:notes xmlns:a="http://schemas.openxmlformats.org/drawingml/2006/main" xmlns:r="http://schemas.openxmlformats.org/officeDocument/2006/relationships" xmlns:p="http://schemas.openxmlformats.org/presentationml/2006/main">
+  <p:cSld>
+    <p:spTree>
+      <p:nvGrpSpPr>
+        <p:cNvPr id="1" name=""/>
+        <p:cNvGrpSpPr/>
+        <p:nvPr/>
+      </p:nvGrpSpPr>
+      <p:grpSpPr>
+        <a:xfrm>
+          <a:off x="0" y="0"/>
+          <a:ext cx="0" cy="0"/>
+          <a:chOff x="0" y="0"/>
+          <a:chExt cx="0" cy="0"/>
+        </a:xfrm>
+      </p:grpSpPr>
+      <p:sp>
+        <p:nvSpPr>
+          <p:cNvPr id="2" name="Slide Image Placeholder 1"/>
+          <p:cNvSpPr>
+            <a:spLocks noGrp="1" noRot="1" noChangeAspect="1"/>
+          </p:cNvSpPr>
+          <p:nvPr>
+            <p:ph type="sldImg"/>
+          </p:nvPr>
+        </p:nvSpPr>
+        <p:spPr/>
+      </p:sp>
+      <p:sp>
+        <p:nvSpPr>
+          <p:cNvPr id="3" name="Notes Placeholder 2"/>
+          <p:cNvSpPr>
+            <a:spLocks noGrp="1"/>
+          </p:cNvSpPr>
+          <p:nvPr>
+            <p:ph type="body" idx="1"/>
+          </p:nvPr>
+        </p:nvSpPr>
+        <p:spPr/>
+        <p:txBody>
+          <a:bodyPr/>
+          <a:lstStyle/>
+          <a:p>
+            <a:r>
+              <a:rPr lang="en-US" b="0" i="0" dirty="0">
+                <a:solidFill>
+                  <a:srgbClr val="374151"/>
+                </a:solidFill>
+                <a:effectLst/>
+                <a:highlight>
+                  <a:srgbClr val="FFFFFF"/>
+                </a:highlight>
+                <a:latin typeface="Droid Serif"/>
+              </a:rPr>
+              <a:t>Used .</a:t>
+            </a:r>
+            <a:r>
+              <a:rPr lang="en-US" b="0" i="0" dirty="0" err="1">
+                <a:solidFill>
+                  <a:srgbClr val="374151"/>
+                </a:solidFill>
+                <a:effectLst/>
+                <a:highlight>
+                  <a:srgbClr val="FFFFFF"/>
+                </a:highlight>
+                <a:latin typeface="Droid Serif"/>
+              </a:rPr>
+              <a:t>fillna</a:t>
+            </a:r>
+            <a:r>
+              <a:rPr lang="en-US" b="0" i="0" dirty="0">
+                <a:solidFill>
+                  <a:srgbClr val="374151"/>
+                </a:solidFill>
+                <a:effectLst/>
+                <a:highlight>
+                  <a:srgbClr val="FFFFFF"/>
+                </a:highlight>
+                <a:latin typeface="Droid Serif"/>
+              </a:rPr>
+              <a:t>(0) to put zeros in all the empty spaces in the columns that we were changing to the integer data type</a:t>
+            </a:r>
+          </a:p>
+          <a:p>
+            <a:endParaRPr lang="en-US" b="0" i="0" dirty="0">
+              <a:solidFill>
+                <a:srgbClr val="374151"/>
+              </a:solidFill>
+              <a:effectLst/>
+              <a:highlight>
+                <a:srgbClr val="FFFFFF"/>
+              </a:highlight>
+              <a:latin typeface="Droid Serif"/>
+            </a:endParaRPr>
+          </a:p>
+          <a:p>
+            <a:r>
+              <a:rPr lang="en-US" b="0" i="0" dirty="0">
+                <a:solidFill>
+                  <a:srgbClr val="374151"/>
+                </a:solidFill>
+                <a:effectLst/>
+                <a:highlight>
+                  <a:srgbClr val="FFFFFF"/>
+                </a:highlight>
+                <a:latin typeface="Droid Serif"/>
+              </a:rPr>
+              <a:t>The </a:t>
+            </a:r>
+            <a:r>
+              <a:rPr lang="en-US" b="1" i="0" dirty="0" err="1">
+                <a:solidFill>
+                  <a:srgbClr val="374151"/>
+                </a:solidFill>
+                <a:effectLst/>
+                <a:highlight>
+                  <a:srgbClr val="FFFFFF"/>
+                </a:highlight>
+                <a:latin typeface="Droid Serif"/>
+              </a:rPr>
+              <a:t>to_numeric</a:t>
+            </a:r>
+            <a:r>
+              <a:rPr lang="en-US" b="1" i="0" dirty="0">
+                <a:solidFill>
+                  <a:srgbClr val="374151"/>
+                </a:solidFill>
+                <a:effectLst/>
+                <a:highlight>
+                  <a:srgbClr val="FFFFFF"/>
+                </a:highlight>
+                <a:latin typeface="Droid Serif"/>
+              </a:rPr>
+              <a:t> function</a:t>
+            </a:r>
+            <a:r>
+              <a:rPr lang="en-US" b="0" i="0" dirty="0">
+                <a:solidFill>
+                  <a:srgbClr val="374151"/>
+                </a:solidFill>
+                <a:effectLst/>
+                <a:highlight>
+                  <a:srgbClr val="FFFFFF"/>
+                </a:highlight>
+                <a:latin typeface="Droid Serif"/>
+              </a:rPr>
+              <a:t> in pandas is used to convert the given argument to a numeric type. The argument is converted to </a:t>
+            </a:r>
+            <a:r>
+              <a:rPr lang="en-US" dirty="0"/>
+              <a:t>float64</a:t>
+            </a:r>
+            <a:r>
+              <a:rPr lang="en-US" b="0" i="0" dirty="0">
+                <a:solidFill>
+                  <a:srgbClr val="374151"/>
+                </a:solidFill>
+                <a:effectLst/>
+                <a:highlight>
+                  <a:srgbClr val="FFFFFF"/>
+                </a:highlight>
+                <a:latin typeface="Droid Serif"/>
+              </a:rPr>
+              <a:t> or </a:t>
+            </a:r>
+            <a:r>
+              <a:rPr lang="en-US" dirty="0"/>
+              <a:t>int64</a:t>
+            </a:r>
+            <a:r>
+              <a:rPr lang="en-US" b="0" i="0" dirty="0">
+                <a:solidFill>
+                  <a:srgbClr val="374151"/>
+                </a:solidFill>
+                <a:effectLst/>
+                <a:highlight>
+                  <a:srgbClr val="FFFFFF"/>
+                </a:highlight>
+                <a:latin typeface="Droid Serif"/>
+              </a:rPr>
+              <a:t> by default, based on what is provided in the arguments. We can use the </a:t>
+            </a:r>
+            <a:r>
+              <a:rPr lang="en-US" dirty="0"/>
+              <a:t>downcast</a:t>
+            </a:r>
+            <a:r>
+              <a:rPr lang="en-US" b="0" i="0" dirty="0">
+                <a:solidFill>
+                  <a:srgbClr val="374151"/>
+                </a:solidFill>
+                <a:effectLst/>
+                <a:highlight>
+                  <a:srgbClr val="FFFFFF"/>
+                </a:highlight>
+                <a:latin typeface="Droid Serif"/>
+              </a:rPr>
+              <a:t> parameter if we want to convert data to a particular type.</a:t>
+            </a:r>
+          </a:p>
+          <a:p>
+            <a:r>
+              <a:rPr lang="en-US" b="0" i="0" dirty="0">
+                <a:solidFill>
+                  <a:srgbClr val="C7254E"/>
+                </a:solidFill>
+                <a:effectLst/>
+                <a:highlight>
+                  <a:srgbClr val="F9F2F4"/>
+                </a:highlight>
+                <a:latin typeface="Menlo"/>
+              </a:rPr>
+              <a:t>Downcast</a:t>
+            </a:r>
+            <a:r>
+              <a:rPr lang="en-US" b="0" i="0" dirty="0">
+                <a:solidFill>
+                  <a:srgbClr val="374151"/>
+                </a:solidFill>
+                <a:effectLst/>
+                <a:highlight>
+                  <a:srgbClr val="FFFFFF"/>
+                </a:highlight>
+                <a:latin typeface="Droid Serif"/>
+              </a:rPr>
+              <a:t> - Specifies conversion to a particular datatype. Can be </a:t>
+            </a:r>
+            <a:r>
+              <a:rPr lang="en-US" dirty="0"/>
+              <a:t>int</a:t>
+            </a:r>
+            <a:r>
+              <a:rPr lang="en-US" b="0" i="0" dirty="0">
+                <a:solidFill>
+                  <a:srgbClr val="374151"/>
+                </a:solidFill>
+                <a:effectLst/>
+                <a:highlight>
+                  <a:srgbClr val="FFFFFF"/>
+                </a:highlight>
+                <a:latin typeface="Droid Serif"/>
+              </a:rPr>
+              <a:t>, </a:t>
+            </a:r>
+            <a:r>
+              <a:rPr lang="en-US" dirty="0"/>
+              <a:t>signed</a:t>
+            </a:r>
+            <a:r>
+              <a:rPr lang="en-US" b="0" i="0" dirty="0">
+                <a:solidFill>
+                  <a:srgbClr val="374151"/>
+                </a:solidFill>
+                <a:effectLst/>
+                <a:highlight>
+                  <a:srgbClr val="FFFFFF"/>
+                </a:highlight>
+                <a:latin typeface="Droid Serif"/>
+              </a:rPr>
+              <a:t>, </a:t>
+            </a:r>
+            <a:r>
+              <a:rPr lang="en-US" dirty="0"/>
+              <a:t>unsigned</a:t>
+            </a:r>
+            <a:r>
+              <a:rPr lang="en-US" b="0" i="0" dirty="0">
+                <a:solidFill>
+                  <a:srgbClr val="374151"/>
+                </a:solidFill>
+                <a:effectLst/>
+                <a:highlight>
+                  <a:srgbClr val="FFFFFF"/>
+                </a:highlight>
+                <a:latin typeface="Droid Serif"/>
+              </a:rPr>
+              <a:t> or </a:t>
+            </a:r>
+            <a:r>
+              <a:rPr lang="en-US" dirty="0"/>
+              <a:t>float</a:t>
+            </a:r>
+            <a:r>
+              <a:rPr lang="en-US" b="0" i="0" dirty="0">
+                <a:solidFill>
+                  <a:srgbClr val="374151"/>
+                </a:solidFill>
+                <a:effectLst/>
+                <a:highlight>
+                  <a:srgbClr val="FFFFFF"/>
+                </a:highlight>
+                <a:latin typeface="Droid Serif"/>
+              </a:rPr>
+              <a:t>. By default, it is </a:t>
+            </a:r>
+            <a:r>
+              <a:rPr lang="en-US" dirty="0"/>
+              <a:t>None</a:t>
+            </a:r>
+            <a:r>
+              <a:rPr lang="en-US" b="0" i="0" dirty="0">
+                <a:solidFill>
+                  <a:srgbClr val="374151"/>
+                </a:solidFill>
+                <a:effectLst/>
+                <a:highlight>
+                  <a:srgbClr val="FFFFFF"/>
+                </a:highlight>
+                <a:latin typeface="Droid Serif"/>
+              </a:rPr>
+              <a:t>. If it is not </a:t>
+            </a:r>
+            <a:r>
+              <a:rPr lang="en-US" dirty="0"/>
+              <a:t>None</a:t>
+            </a:r>
+            <a:r>
+              <a:rPr lang="en-US" b="0" i="0" dirty="0">
+                <a:solidFill>
+                  <a:srgbClr val="374151"/>
+                </a:solidFill>
+                <a:effectLst/>
+                <a:highlight>
+                  <a:srgbClr val="FFFFFF"/>
+                </a:highlight>
+                <a:latin typeface="Droid Serif"/>
+              </a:rPr>
+              <a:t>, pandas will downcast the data to the smallest data type possible.</a:t>
+            </a:r>
+          </a:p>
+          <a:p>
+            <a:r>
+              <a:rPr lang="en-US" dirty="0"/>
+              <a:t>https://www.educative.io/answers/what-is-the-tonumeric-function-in-pandas</a:t>
+            </a:r>
+          </a:p>
+        </p:txBody>
+      </p:sp>
+      <p:sp>
+        <p:nvSpPr>
+          <p:cNvPr id="4" name="Slide Number Placeholder 3"/>
+          <p:cNvSpPr>
+            <a:spLocks noGrp="1"/>
+          </p:cNvSpPr>
+          <p:nvPr>
+            <p:ph type="sldNum" sz="quarter" idx="5"/>
+          </p:nvPr>
+        </p:nvSpPr>
+        <p:spPr/>
+        <p:txBody>
+          <a:bodyPr/>
+          <a:lstStyle/>
+          <a:p>
+            <a:fld id="{2A82BF32-25B9-4CFB-82AF-946389DD5021}" type="slidenum">
+              <a:rPr lang="en-US" smtClean="0"/>
+              <a:t>5</a:t>
+            </a:fld>
+            <a:endParaRPr lang="en-US"/>
+          </a:p>
+        </p:txBody>
+      </p:sp>
+    </p:spTree>
+    <p:extLst>
+      <p:ext uri="{BB962C8B-B14F-4D97-AF65-F5344CB8AC3E}">
+        <p14:creationId xmlns:p14="http://schemas.microsoft.com/office/powerpoint/2010/main" val="1612307411"/>
+      </p:ext>
+    </p:extLst>
+  </p:cSld>
+  <p:clrMapOvr>
+    <a:masterClrMapping/>
+  </p:clrMapOvr>
+</p:notes>
+</file>
+
+<file path=ppt/notesSlides/notesSlide4.xml><?xml version="1.0" encoding="utf-8"?>
+<p:notes xmlns:a="http://schemas.openxmlformats.org/drawingml/2006/main" xmlns:r="http://schemas.openxmlformats.org/officeDocument/2006/relationships" xmlns:p="http://schemas.openxmlformats.org/presentationml/2006/main">
+  <p:cSld>
+    <p:spTree>
+      <p:nvGrpSpPr>
+        <p:cNvPr id="1" name=""/>
+        <p:cNvGrpSpPr/>
+        <p:nvPr/>
+      </p:nvGrpSpPr>
+      <p:grpSpPr>
+        <a:xfrm>
+          <a:off x="0" y="0"/>
+          <a:ext cx="0" cy="0"/>
+          <a:chOff x="0" y="0"/>
+          <a:chExt cx="0" cy="0"/>
+        </a:xfrm>
+      </p:grpSpPr>
+      <p:sp>
+        <p:nvSpPr>
+          <p:cNvPr id="2" name="Slide Image Placeholder 1"/>
+          <p:cNvSpPr>
+            <a:spLocks noGrp="1" noRot="1" noChangeAspect="1"/>
+          </p:cNvSpPr>
+          <p:nvPr>
+            <p:ph type="sldImg"/>
+          </p:nvPr>
+        </p:nvSpPr>
+        <p:spPr/>
+      </p:sp>
+      <p:sp>
+        <p:nvSpPr>
+          <p:cNvPr id="3" name="Notes Placeholder 2"/>
+          <p:cNvSpPr>
+            <a:spLocks noGrp="1"/>
+          </p:cNvSpPr>
+          <p:nvPr>
+            <p:ph type="body" idx="1"/>
+          </p:nvPr>
+        </p:nvSpPr>
+        <p:spPr/>
+        <p:txBody>
+          <a:bodyPr/>
+          <a:lstStyle/>
+          <a:p>
+            <a:r>
+              <a:rPr lang="en-US" dirty="0"/>
+              <a:t>I used .head() to look at the </a:t>
+            </a:r>
+            <a:r>
+              <a:rPr lang="en-US" dirty="0" err="1"/>
+              <a:t>dataframes</a:t>
+            </a:r>
+            <a:r>
+              <a:rPr lang="en-US" dirty="0"/>
+              <a:t>, but when we went to load it into the database we were running into errors, turns out there are airports outside of the US and not every one was a 2 digit state.  Updated to column title to location for accuracy.</a:t>
+            </a:r>
+          </a:p>
+          <a:p>
+            <a:r>
+              <a:rPr lang="en-US" dirty="0"/>
+              <a:t>Lesson learned = look at all your data and don’t assume.</a:t>
+            </a:r>
+          </a:p>
+        </p:txBody>
+      </p:sp>
+      <p:sp>
+        <p:nvSpPr>
+          <p:cNvPr id="4" name="Slide Number Placeholder 3"/>
+          <p:cNvSpPr>
+            <a:spLocks noGrp="1"/>
+          </p:cNvSpPr>
+          <p:nvPr>
+            <p:ph type="sldNum" sz="quarter" idx="5"/>
+          </p:nvPr>
+        </p:nvSpPr>
+        <p:spPr/>
+        <p:txBody>
+          <a:bodyPr/>
+          <a:lstStyle/>
+          <a:p>
+            <a:fld id="{2A82BF32-25B9-4CFB-82AF-946389DD5021}" type="slidenum">
+              <a:rPr lang="en-US" smtClean="0"/>
+              <a:t>6</a:t>
+            </a:fld>
+            <a:endParaRPr lang="en-US"/>
+          </a:p>
+        </p:txBody>
+      </p:sp>
+    </p:spTree>
+    <p:extLst>
+      <p:ext uri="{BB962C8B-B14F-4D97-AF65-F5344CB8AC3E}">
+        <p14:creationId xmlns:p14="http://schemas.microsoft.com/office/powerpoint/2010/main" val="830788613"/>
+      </p:ext>
+    </p:extLst>
+  </p:cSld>
+  <p:clrMapOvr>
+    <a:masterClrMapping/>
+  </p:clrMapOvr>
+</p:notes>
 </file>
 
 <file path=ppt/slideLayouts/slideLayout1.xml><?xml version="1.0" encoding="utf-8"?>
@@ -334,7 +1359,7 @@
           <a:p>
             <a:fld id="{5FC588E6-FAC8-4CB8-904E-4C86C516A14A}" type="datetimeFigureOut">
               <a:rPr lang="en-US" smtClean="0"/>
-              <a:t>4/11/2024</a:t>
+              <a:t>4/15/2024</a:t>
             </a:fld>
             <a:endParaRPr lang="en-US"/>
           </a:p>
@@ -542,7 +1567,7 @@
           <a:p>
             <a:fld id="{5FC588E6-FAC8-4CB8-904E-4C86C516A14A}" type="datetimeFigureOut">
               <a:rPr lang="en-US" smtClean="0"/>
-              <a:t>4/11/2024</a:t>
+              <a:t>4/15/2024</a:t>
             </a:fld>
             <a:endParaRPr lang="en-US"/>
           </a:p>
@@ -798,7 +1823,7 @@
           <a:p>
             <a:fld id="{5FC588E6-FAC8-4CB8-904E-4C86C516A14A}" type="datetimeFigureOut">
               <a:rPr lang="en-US" smtClean="0"/>
-              <a:t>4/11/2024</a:t>
+              <a:t>4/15/2024</a:t>
             </a:fld>
             <a:endParaRPr lang="en-US"/>
           </a:p>
@@ -972,7 +1997,7 @@
           <a:p>
             <a:fld id="{5FC588E6-FAC8-4CB8-904E-4C86C516A14A}" type="datetimeFigureOut">
               <a:rPr lang="en-US" smtClean="0"/>
-              <a:t>4/11/2024</a:t>
+              <a:t>4/15/2024</a:t>
             </a:fld>
             <a:endParaRPr lang="en-US"/>
           </a:p>
@@ -1315,7 +2340,7 @@
           <a:p>
             <a:fld id="{5FC588E6-FAC8-4CB8-904E-4C86C516A14A}" type="datetimeFigureOut">
               <a:rPr lang="en-US" smtClean="0"/>
-              <a:t>4/11/2024</a:t>
+              <a:t>4/15/2024</a:t>
             </a:fld>
             <a:endParaRPr lang="en-US"/>
           </a:p>
@@ -1590,7 +2615,7 @@
           <a:p>
             <a:fld id="{5FC588E6-FAC8-4CB8-904E-4C86C516A14A}" type="datetimeFigureOut">
               <a:rPr lang="en-US" smtClean="0"/>
-              <a:t>4/11/2024</a:t>
+              <a:t>4/15/2024</a:t>
             </a:fld>
             <a:endParaRPr lang="en-US"/>
           </a:p>
@@ -1969,7 +2994,7 @@
           <a:p>
             <a:fld id="{5FC588E6-FAC8-4CB8-904E-4C86C516A14A}" type="datetimeFigureOut">
               <a:rPr lang="en-US" smtClean="0"/>
-              <a:t>4/11/2024</a:t>
+              <a:t>4/15/2024</a:t>
             </a:fld>
             <a:endParaRPr lang="en-US"/>
           </a:p>
@@ -2087,7 +3112,7 @@
           <a:p>
             <a:fld id="{5FC588E6-FAC8-4CB8-904E-4C86C516A14A}" type="datetimeFigureOut">
               <a:rPr lang="en-US" smtClean="0"/>
-              <a:t>4/11/2024</a:t>
+              <a:t>4/15/2024</a:t>
             </a:fld>
             <a:endParaRPr lang="en-US"/>
           </a:p>
@@ -2258,7 +3283,7 @@
           <a:p>
             <a:fld id="{5FC588E6-FAC8-4CB8-904E-4C86C516A14A}" type="datetimeFigureOut">
               <a:rPr lang="en-US" smtClean="0"/>
-              <a:t>4/11/2024</a:t>
+              <a:t>4/15/2024</a:t>
             </a:fld>
             <a:endParaRPr lang="en-US"/>
           </a:p>
@@ -2612,7 +3637,7 @@
           <a:p>
             <a:fld id="{5FC588E6-FAC8-4CB8-904E-4C86C516A14A}" type="datetimeFigureOut">
               <a:rPr lang="en-US" smtClean="0"/>
-              <a:t>4/11/2024</a:t>
+              <a:t>4/15/2024</a:t>
             </a:fld>
             <a:endParaRPr lang="en-US"/>
           </a:p>
@@ -2994,7 +4019,7 @@
           <a:p>
             <a:fld id="{5FC588E6-FAC8-4CB8-904E-4C86C516A14A}" type="datetimeFigureOut">
               <a:rPr lang="en-US" smtClean="0"/>
-              <a:t>4/11/2024</a:t>
+              <a:t>4/15/2024</a:t>
             </a:fld>
             <a:endParaRPr lang="en-US"/>
           </a:p>
@@ -3281,7 +4306,7 @@
           <a:p>
             <a:fld id="{5FC588E6-FAC8-4CB8-904E-4C86C516A14A}" type="datetimeFigureOut">
               <a:rPr lang="en-US" smtClean="0"/>
-              <a:t>4/11/2024</a:t>
+              <a:t>4/15/2024</a:t>
             </a:fld>
             <a:endParaRPr lang="en-US"/>
           </a:p>
@@ -4001,7 +5026,7 @@
                 <a:ea typeface="Calibri" panose="020F0502020204030204" pitchFamily="34" charset="0"/>
                 <a:cs typeface="Times New Roman" panose="02020603050405020304" pitchFamily="18" charset="0"/>
               </a:rPr>
-              <a:t>Flight level data from the US Department of Transportation</a:t>
+              <a:t>Flight level data from the US Department of Transportation for August 2018</a:t>
             </a:r>
           </a:p>
           <a:p>
@@ -4092,6 +5117,545 @@
     <p:extLst>
       <p:ext uri="{BB962C8B-B14F-4D97-AF65-F5344CB8AC3E}">
         <p14:creationId xmlns:p14="http://schemas.microsoft.com/office/powerpoint/2010/main" val="1634302453"/>
+      </p:ext>
+    </p:extLst>
+  </p:cSld>
+  <p:clrMapOvr>
+    <a:masterClrMapping/>
+  </p:clrMapOvr>
+</p:sld>
+</file>
+
+<file path=ppt/slides/slide3.xml><?xml version="1.0" encoding="utf-8"?>
+<p:sld xmlns:a="http://schemas.openxmlformats.org/drawingml/2006/main" xmlns:r="http://schemas.openxmlformats.org/officeDocument/2006/relationships" xmlns:p="http://schemas.openxmlformats.org/presentationml/2006/main">
+  <p:cSld>
+    <p:spTree>
+      <p:nvGrpSpPr>
+        <p:cNvPr id="1" name=""/>
+        <p:cNvGrpSpPr/>
+        <p:nvPr/>
+      </p:nvGrpSpPr>
+      <p:grpSpPr>
+        <a:xfrm>
+          <a:off x="0" y="0"/>
+          <a:ext cx="0" cy="0"/>
+          <a:chOff x="0" y="0"/>
+          <a:chExt cx="0" cy="0"/>
+        </a:xfrm>
+      </p:grpSpPr>
+      <p:sp>
+        <p:nvSpPr>
+          <p:cNvPr id="2" name="Title 1">
+            <a:extLst>
+              <a:ext uri="{FF2B5EF4-FFF2-40B4-BE49-F238E27FC236}">
+                <a16:creationId xmlns:a16="http://schemas.microsoft.com/office/drawing/2014/main" id="{F921C890-7872-4834-0752-E269FFC26058}"/>
+              </a:ext>
+            </a:extLst>
+          </p:cNvPr>
+          <p:cNvSpPr>
+            <a:spLocks noGrp="1"/>
+          </p:cNvSpPr>
+          <p:nvPr>
+            <p:ph type="title"/>
+          </p:nvPr>
+        </p:nvSpPr>
+        <p:spPr/>
+        <p:txBody>
+          <a:bodyPr/>
+          <a:lstStyle/>
+          <a:p>
+            <a:r>
+              <a:rPr lang="en-US" dirty="0"/>
+              <a:t>Data Cleaning: split function</a:t>
+            </a:r>
+          </a:p>
+        </p:txBody>
+      </p:sp>
+      <p:pic>
+        <p:nvPicPr>
+          <p:cNvPr id="7" name="Content Placeholder 6">
+            <a:extLst>
+              <a:ext uri="{FF2B5EF4-FFF2-40B4-BE49-F238E27FC236}">
+                <a16:creationId xmlns:a16="http://schemas.microsoft.com/office/drawing/2014/main" id="{8A151473-3BEA-363E-7226-B6259EF67AF4}"/>
+              </a:ext>
+            </a:extLst>
+          </p:cNvPr>
+          <p:cNvPicPr>
+            <a:picLocks noGrp="1" noChangeAspect="1"/>
+          </p:cNvPicPr>
+          <p:nvPr>
+            <p:ph sz="half" idx="1"/>
+          </p:nvPr>
+        </p:nvPicPr>
+        <p:blipFill>
+          <a:blip r:embed="rId3"/>
+          <a:stretch>
+            <a:fillRect/>
+          </a:stretch>
+        </p:blipFill>
+        <p:spPr>
+          <a:xfrm>
+            <a:off x="1279526" y="1944907"/>
+            <a:ext cx="5256116" cy="1890393"/>
+          </a:xfrm>
+        </p:spPr>
+      </p:pic>
+      <p:pic>
+        <p:nvPicPr>
+          <p:cNvPr id="9" name="Content Placeholder 8">
+            <a:extLst>
+              <a:ext uri="{FF2B5EF4-FFF2-40B4-BE49-F238E27FC236}">
+                <a16:creationId xmlns:a16="http://schemas.microsoft.com/office/drawing/2014/main" id="{0986C6E4-7505-9364-0F47-5A53A6400E23}"/>
+              </a:ext>
+            </a:extLst>
+          </p:cNvPr>
+          <p:cNvPicPr>
+            <a:picLocks noGrp="1" noChangeAspect="1"/>
+          </p:cNvPicPr>
+          <p:nvPr>
+            <p:ph sz="half" idx="2"/>
+          </p:nvPr>
+        </p:nvPicPr>
+        <p:blipFill>
+          <a:blip r:embed="rId4"/>
+          <a:stretch>
+            <a:fillRect/>
+          </a:stretch>
+        </p:blipFill>
+        <p:spPr>
+          <a:xfrm>
+            <a:off x="1279526" y="3967896"/>
+            <a:ext cx="6555534" cy="2150578"/>
+          </a:xfrm>
+        </p:spPr>
+      </p:pic>
+    </p:spTree>
+    <p:extLst>
+      <p:ext uri="{BB962C8B-B14F-4D97-AF65-F5344CB8AC3E}">
+        <p14:creationId xmlns:p14="http://schemas.microsoft.com/office/powerpoint/2010/main" val="2474261494"/>
+      </p:ext>
+    </p:extLst>
+  </p:cSld>
+  <p:clrMapOvr>
+    <a:masterClrMapping/>
+  </p:clrMapOvr>
+</p:sld>
+</file>
+
+<file path=ppt/slides/slide4.xml><?xml version="1.0" encoding="utf-8"?>
+<p:sld xmlns:a="http://schemas.openxmlformats.org/drawingml/2006/main" xmlns:r="http://schemas.openxmlformats.org/officeDocument/2006/relationships" xmlns:p="http://schemas.openxmlformats.org/presentationml/2006/main">
+  <p:cSld>
+    <p:spTree>
+      <p:nvGrpSpPr>
+        <p:cNvPr id="1" name=""/>
+        <p:cNvGrpSpPr/>
+        <p:nvPr/>
+      </p:nvGrpSpPr>
+      <p:grpSpPr>
+        <a:xfrm>
+          <a:off x="0" y="0"/>
+          <a:ext cx="0" cy="0"/>
+          <a:chOff x="0" y="0"/>
+          <a:chExt cx="0" cy="0"/>
+        </a:xfrm>
+      </p:grpSpPr>
+      <p:sp>
+        <p:nvSpPr>
+          <p:cNvPr id="2" name="Title 1">
+            <a:extLst>
+              <a:ext uri="{FF2B5EF4-FFF2-40B4-BE49-F238E27FC236}">
+                <a16:creationId xmlns:a16="http://schemas.microsoft.com/office/drawing/2014/main" id="{D5C64DBD-7CC8-8DEB-D396-B7727E84647B}"/>
+              </a:ext>
+            </a:extLst>
+          </p:cNvPr>
+          <p:cNvSpPr>
+            <a:spLocks noGrp="1"/>
+          </p:cNvSpPr>
+          <p:nvPr>
+            <p:ph type="title"/>
+          </p:nvPr>
+        </p:nvSpPr>
+        <p:spPr/>
+        <p:txBody>
+          <a:bodyPr/>
+          <a:lstStyle/>
+          <a:p>
+            <a:r>
+              <a:rPr lang="en-US" dirty="0"/>
+              <a:t>Data Cleaning: </a:t>
+            </a:r>
+            <a:r>
+              <a:rPr lang="en-US" dirty="0" err="1"/>
+              <a:t>str.lower</a:t>
+            </a:r>
+            <a:r>
+              <a:rPr lang="en-US" dirty="0"/>
+              <a:t> &amp; index.name </a:t>
+            </a:r>
+          </a:p>
+        </p:txBody>
+      </p:sp>
+      <p:pic>
+        <p:nvPicPr>
+          <p:cNvPr id="6" name="Content Placeholder 5">
+            <a:extLst>
+              <a:ext uri="{FF2B5EF4-FFF2-40B4-BE49-F238E27FC236}">
+                <a16:creationId xmlns:a16="http://schemas.microsoft.com/office/drawing/2014/main" id="{11034AEF-6069-6A56-80A9-060DFB956F8B}"/>
+              </a:ext>
+            </a:extLst>
+          </p:cNvPr>
+          <p:cNvPicPr>
+            <a:picLocks noGrp="1" noChangeAspect="1"/>
+          </p:cNvPicPr>
+          <p:nvPr>
+            <p:ph sz="half" idx="1"/>
+          </p:nvPr>
+        </p:nvPicPr>
+        <p:blipFill>
+          <a:blip r:embed="rId3"/>
+          <a:stretch>
+            <a:fillRect/>
+          </a:stretch>
+        </p:blipFill>
+        <p:spPr>
+          <a:xfrm>
+            <a:off x="1096963" y="3123371"/>
+            <a:ext cx="4846180" cy="1710928"/>
+          </a:xfrm>
+        </p:spPr>
+      </p:pic>
+      <p:pic>
+        <p:nvPicPr>
+          <p:cNvPr id="8" name="Content Placeholder 7">
+            <a:extLst>
+              <a:ext uri="{FF2B5EF4-FFF2-40B4-BE49-F238E27FC236}">
+                <a16:creationId xmlns:a16="http://schemas.microsoft.com/office/drawing/2014/main" id="{21BFB108-37D2-0199-C273-FD4EA03D8B6C}"/>
+              </a:ext>
+            </a:extLst>
+          </p:cNvPr>
+          <p:cNvPicPr>
+            <a:picLocks noGrp="1" noChangeAspect="1"/>
+          </p:cNvPicPr>
+          <p:nvPr>
+            <p:ph sz="half" idx="2"/>
+          </p:nvPr>
+        </p:nvPicPr>
+        <p:blipFill>
+          <a:blip r:embed="rId4"/>
+          <a:stretch>
+            <a:fillRect/>
+          </a:stretch>
+        </p:blipFill>
+        <p:spPr>
+          <a:xfrm>
+            <a:off x="6476649" y="2307014"/>
+            <a:ext cx="4510478" cy="2131388"/>
+          </a:xfrm>
+        </p:spPr>
+      </p:pic>
+      <p:pic>
+        <p:nvPicPr>
+          <p:cNvPr id="10" name="Picture 9">
+            <a:extLst>
+              <a:ext uri="{FF2B5EF4-FFF2-40B4-BE49-F238E27FC236}">
+                <a16:creationId xmlns:a16="http://schemas.microsoft.com/office/drawing/2014/main" id="{A35761EF-EEFC-028B-5314-7DC09BD47717}"/>
+              </a:ext>
+            </a:extLst>
+          </p:cNvPr>
+          <p:cNvPicPr>
+            <a:picLocks noChangeAspect="1"/>
+          </p:cNvPicPr>
+          <p:nvPr/>
+        </p:nvPicPr>
+        <p:blipFill>
+          <a:blip r:embed="rId5"/>
+          <a:stretch>
+            <a:fillRect/>
+          </a:stretch>
+        </p:blipFill>
+        <p:spPr>
+          <a:xfrm>
+            <a:off x="1096962" y="2074560"/>
+            <a:ext cx="4846180" cy="910723"/>
+          </a:xfrm>
+          <a:prstGeom prst="rect">
+            <a:avLst/>
+          </a:prstGeom>
+        </p:spPr>
+      </p:pic>
+    </p:spTree>
+    <p:extLst>
+      <p:ext uri="{BB962C8B-B14F-4D97-AF65-F5344CB8AC3E}">
+        <p14:creationId xmlns:p14="http://schemas.microsoft.com/office/powerpoint/2010/main" val="2643887466"/>
+      </p:ext>
+    </p:extLst>
+  </p:cSld>
+  <p:clrMapOvr>
+    <a:masterClrMapping/>
+  </p:clrMapOvr>
+</p:sld>
+</file>
+
+<file path=ppt/slides/slide5.xml><?xml version="1.0" encoding="utf-8"?>
+<p:sld xmlns:a="http://schemas.openxmlformats.org/drawingml/2006/main" xmlns:r="http://schemas.openxmlformats.org/officeDocument/2006/relationships" xmlns:p="http://schemas.openxmlformats.org/presentationml/2006/main">
+  <p:cSld>
+    <p:spTree>
+      <p:nvGrpSpPr>
+        <p:cNvPr id="1" name=""/>
+        <p:cNvGrpSpPr/>
+        <p:nvPr/>
+      </p:nvGrpSpPr>
+      <p:grpSpPr>
+        <a:xfrm>
+          <a:off x="0" y="0"/>
+          <a:ext cx="0" cy="0"/>
+          <a:chOff x="0" y="0"/>
+          <a:chExt cx="0" cy="0"/>
+        </a:xfrm>
+      </p:grpSpPr>
+      <p:sp>
+        <p:nvSpPr>
+          <p:cNvPr id="2" name="Title 1">
+            <a:extLst>
+              <a:ext uri="{FF2B5EF4-FFF2-40B4-BE49-F238E27FC236}">
+                <a16:creationId xmlns:a16="http://schemas.microsoft.com/office/drawing/2014/main" id="{6CC9C8AA-5CF7-62E9-6430-87631509E633}"/>
+              </a:ext>
+            </a:extLst>
+          </p:cNvPr>
+          <p:cNvSpPr>
+            <a:spLocks noGrp="1"/>
+          </p:cNvSpPr>
+          <p:nvPr>
+            <p:ph type="title"/>
+          </p:nvPr>
+        </p:nvSpPr>
+        <p:spPr/>
+        <p:txBody>
+          <a:bodyPr/>
+          <a:lstStyle/>
+          <a:p>
+            <a:r>
+              <a:rPr lang="en-US" dirty="0"/>
+              <a:t>Data Cleaning: .</a:t>
+            </a:r>
+            <a:r>
+              <a:rPr lang="en-US" dirty="0" err="1"/>
+              <a:t>fillna</a:t>
+            </a:r>
+            <a:r>
+              <a:rPr lang="en-US" dirty="0"/>
+              <a:t> &amp; downcast</a:t>
+            </a:r>
+          </a:p>
+        </p:txBody>
+      </p:sp>
+      <p:pic>
+        <p:nvPicPr>
+          <p:cNvPr id="8" name="Content Placeholder 7">
+            <a:extLst>
+              <a:ext uri="{FF2B5EF4-FFF2-40B4-BE49-F238E27FC236}">
+                <a16:creationId xmlns:a16="http://schemas.microsoft.com/office/drawing/2014/main" id="{9D3C68E2-D642-6220-E81D-5E2EA75AFF0A}"/>
+              </a:ext>
+            </a:extLst>
+          </p:cNvPr>
+          <p:cNvPicPr>
+            <a:picLocks noGrp="1" noChangeAspect="1"/>
+          </p:cNvPicPr>
+          <p:nvPr>
+            <p:ph sz="half" idx="2"/>
+          </p:nvPr>
+        </p:nvPicPr>
+        <p:blipFill>
+          <a:blip r:embed="rId3"/>
+          <a:stretch>
+            <a:fillRect/>
+          </a:stretch>
+        </p:blipFill>
+        <p:spPr>
+          <a:xfrm>
+            <a:off x="4264115" y="1939616"/>
+            <a:ext cx="5597382" cy="4022725"/>
+          </a:xfrm>
+        </p:spPr>
+      </p:pic>
+      <p:pic>
+        <p:nvPicPr>
+          <p:cNvPr id="12" name="Content Placeholder 11">
+            <a:extLst>
+              <a:ext uri="{FF2B5EF4-FFF2-40B4-BE49-F238E27FC236}">
+                <a16:creationId xmlns:a16="http://schemas.microsoft.com/office/drawing/2014/main" id="{B9A01172-8AB0-3E7E-B791-638E80624066}"/>
+              </a:ext>
+            </a:extLst>
+          </p:cNvPr>
+          <p:cNvPicPr>
+            <a:picLocks noGrp="1" noChangeAspect="1"/>
+          </p:cNvPicPr>
+          <p:nvPr>
+            <p:ph sz="half" idx="1"/>
+          </p:nvPr>
+        </p:nvPicPr>
+        <p:blipFill>
+          <a:blip r:embed="rId4"/>
+          <a:stretch>
+            <a:fillRect/>
+          </a:stretch>
+        </p:blipFill>
+        <p:spPr>
+          <a:xfrm>
+            <a:off x="1054694" y="1927314"/>
+            <a:ext cx="2674541" cy="3181854"/>
+          </a:xfrm>
+        </p:spPr>
+      </p:pic>
+    </p:spTree>
+    <p:extLst>
+      <p:ext uri="{BB962C8B-B14F-4D97-AF65-F5344CB8AC3E}">
+        <p14:creationId xmlns:p14="http://schemas.microsoft.com/office/powerpoint/2010/main" val="431162547"/>
+      </p:ext>
+    </p:extLst>
+  </p:cSld>
+  <p:clrMapOvr>
+    <a:masterClrMapping/>
+  </p:clrMapOvr>
+</p:sld>
+</file>
+
+<file path=ppt/slides/slide6.xml><?xml version="1.0" encoding="utf-8"?>
+<p:sld xmlns:a="http://schemas.openxmlformats.org/drawingml/2006/main" xmlns:r="http://schemas.openxmlformats.org/officeDocument/2006/relationships" xmlns:p="http://schemas.openxmlformats.org/presentationml/2006/main">
+  <p:cSld>
+    <p:spTree>
+      <p:nvGrpSpPr>
+        <p:cNvPr id="1" name=""/>
+        <p:cNvGrpSpPr/>
+        <p:nvPr/>
+      </p:nvGrpSpPr>
+      <p:grpSpPr>
+        <a:xfrm>
+          <a:off x="0" y="0"/>
+          <a:ext cx="0" cy="0"/>
+          <a:chOff x="0" y="0"/>
+          <a:chExt cx="0" cy="0"/>
+        </a:xfrm>
+      </p:grpSpPr>
+      <p:sp>
+        <p:nvSpPr>
+          <p:cNvPr id="2" name="Title 1">
+            <a:extLst>
+              <a:ext uri="{FF2B5EF4-FFF2-40B4-BE49-F238E27FC236}">
+                <a16:creationId xmlns:a16="http://schemas.microsoft.com/office/drawing/2014/main" id="{016F59BD-C8A4-EC9F-85D4-AE9CE4C6AF48}"/>
+              </a:ext>
+            </a:extLst>
+          </p:cNvPr>
+          <p:cNvSpPr>
+            <a:spLocks noGrp="1"/>
+          </p:cNvSpPr>
+          <p:nvPr>
+            <p:ph type="title"/>
+          </p:nvPr>
+        </p:nvSpPr>
+        <p:spPr/>
+        <p:txBody>
+          <a:bodyPr/>
+          <a:lstStyle/>
+          <a:p>
+            <a:r>
+              <a:rPr lang="en-US" dirty="0"/>
+              <a:t>Data Cleaning: Understand your Data</a:t>
+            </a:r>
+          </a:p>
+        </p:txBody>
+      </p:sp>
+      <p:sp>
+        <p:nvSpPr>
+          <p:cNvPr id="10" name="Content Placeholder 9">
+            <a:extLst>
+              <a:ext uri="{FF2B5EF4-FFF2-40B4-BE49-F238E27FC236}">
+                <a16:creationId xmlns:a16="http://schemas.microsoft.com/office/drawing/2014/main" id="{0855E508-F98E-75C6-2F93-FC1223632467}"/>
+              </a:ext>
+            </a:extLst>
+          </p:cNvPr>
+          <p:cNvSpPr>
+            <a:spLocks noGrp="1"/>
+          </p:cNvSpPr>
+          <p:nvPr>
+            <p:ph sz="half" idx="2"/>
+          </p:nvPr>
+        </p:nvSpPr>
+        <p:spPr/>
+        <p:txBody>
+          <a:bodyPr/>
+          <a:lstStyle/>
+          <a:p>
+            <a:pPr marL="0" indent="0">
+              <a:buNone/>
+            </a:pPr>
+            <a:endParaRPr lang="en-US" dirty="0"/>
+          </a:p>
+        </p:txBody>
+      </p:sp>
+      <p:pic>
+        <p:nvPicPr>
+          <p:cNvPr id="12" name="Picture 11">
+            <a:extLst>
+              <a:ext uri="{FF2B5EF4-FFF2-40B4-BE49-F238E27FC236}">
+                <a16:creationId xmlns:a16="http://schemas.microsoft.com/office/drawing/2014/main" id="{BCB64EB5-EC51-4CF1-B408-D2479AF65C05}"/>
+              </a:ext>
+            </a:extLst>
+          </p:cNvPr>
+          <p:cNvPicPr>
+            <a:picLocks noChangeAspect="1"/>
+          </p:cNvPicPr>
+          <p:nvPr/>
+        </p:nvPicPr>
+        <p:blipFill>
+          <a:blip r:embed="rId3"/>
+          <a:stretch>
+            <a:fillRect/>
+          </a:stretch>
+        </p:blipFill>
+        <p:spPr>
+          <a:xfrm>
+            <a:off x="6462789" y="2531415"/>
+            <a:ext cx="4692891" cy="2521080"/>
+          </a:xfrm>
+          <a:prstGeom prst="rect">
+            <a:avLst/>
+          </a:prstGeom>
+        </p:spPr>
+      </p:pic>
+      <p:pic>
+        <p:nvPicPr>
+          <p:cNvPr id="20" name="Content Placeholder 19">
+            <a:extLst>
+              <a:ext uri="{FF2B5EF4-FFF2-40B4-BE49-F238E27FC236}">
+                <a16:creationId xmlns:a16="http://schemas.microsoft.com/office/drawing/2014/main" id="{5EE78047-18AA-42EE-2C9A-F6AE8DD0CDE5}"/>
+              </a:ext>
+            </a:extLst>
+          </p:cNvPr>
+          <p:cNvPicPr>
+            <a:picLocks noGrp="1" noChangeAspect="1"/>
+          </p:cNvPicPr>
+          <p:nvPr>
+            <p:ph sz="half" idx="1"/>
+          </p:nvPr>
+        </p:nvPicPr>
+        <p:blipFill>
+          <a:blip r:embed="rId4"/>
+          <a:stretch>
+            <a:fillRect/>
+          </a:stretch>
+        </p:blipFill>
+        <p:spPr>
+          <a:xfrm>
+            <a:off x="1127793" y="2609786"/>
+            <a:ext cx="4877051" cy="2495678"/>
+          </a:xfrm>
+        </p:spPr>
+      </p:pic>
+    </p:spTree>
+    <p:extLst>
+      <p:ext uri="{BB962C8B-B14F-4D97-AF65-F5344CB8AC3E}">
+        <p14:creationId xmlns:p14="http://schemas.microsoft.com/office/powerpoint/2010/main" val="810770557"/>
       </p:ext>
     </p:extLst>
   </p:cSld>
@@ -4382,4 +5946,299 @@
     </a:ext>
   </a:extLst>
 </a:theme>
+</file>
+
+<file path=ppt/theme/theme2.xml><?xml version="1.0" encoding="utf-8"?>
+<a:theme xmlns:a="http://schemas.openxmlformats.org/drawingml/2006/main" name="Office Theme">
+  <a:themeElements>
+    <a:clrScheme name="Office">
+      <a:dk1>
+        <a:sysClr val="windowText" lastClr="000000"/>
+      </a:dk1>
+      <a:lt1>
+        <a:sysClr val="window" lastClr="FFFFFF"/>
+      </a:lt1>
+      <a:dk2>
+        <a:srgbClr val="44546A"/>
+      </a:dk2>
+      <a:lt2>
+        <a:srgbClr val="E7E6E6"/>
+      </a:lt2>
+      <a:accent1>
+        <a:srgbClr val="4472C4"/>
+      </a:accent1>
+      <a:accent2>
+        <a:srgbClr val="ED7D31"/>
+      </a:accent2>
+      <a:accent3>
+        <a:srgbClr val="A5A5A5"/>
+      </a:accent3>
+      <a:accent4>
+        <a:srgbClr val="FFC000"/>
+      </a:accent4>
+      <a:accent5>
+        <a:srgbClr val="5B9BD5"/>
+      </a:accent5>
+      <a:accent6>
+        <a:srgbClr val="70AD47"/>
+      </a:accent6>
+      <a:hlink>
+        <a:srgbClr val="0563C1"/>
+      </a:hlink>
+      <a:folHlink>
+        <a:srgbClr val="954F72"/>
+      </a:folHlink>
+    </a:clrScheme>
+    <a:fontScheme name="Office">
+      <a:majorFont>
+        <a:latin typeface="Calibri Light" panose="020F0302020204030204"/>
+        <a:ea typeface=""/>
+        <a:cs typeface=""/>
+        <a:font script="Jpan" typeface="游ゴシック Light"/>
+        <a:font script="Hang" typeface="맑은 고딕"/>
+        <a:font script="Hans" typeface="等线 Light"/>
+        <a:font script="Hant" typeface="新細明體"/>
+        <a:font script="Arab" typeface="Times New Roman"/>
+        <a:font script="Hebr" typeface="Times New Roman"/>
+        <a:font script="Thai" typeface="Angsana New"/>
+        <a:font script="Ethi" typeface="Nyala"/>
+        <a:font script="Beng" typeface="Vrinda"/>
+        <a:font script="Gujr" typeface="Shruti"/>
+        <a:font script="Khmr" typeface="MoolBoran"/>
+        <a:font script="Knda" typeface="Tunga"/>
+        <a:font script="Guru" typeface="Raavi"/>
+        <a:font script="Cans" typeface="Euphemia"/>
+        <a:font script="Cher" typeface="Plantagenet Cherokee"/>
+        <a:font script="Yiii" typeface="Microsoft Yi Baiti"/>
+        <a:font script="Tibt" typeface="Microsoft Himalaya"/>
+        <a:font script="Thaa" typeface="MV Boli"/>
+        <a:font script="Deva" typeface="Mangal"/>
+        <a:font script="Telu" typeface="Gautami"/>
+        <a:font script="Taml" typeface="Latha"/>
+        <a:font script="Syrc" typeface="Estrangelo Edessa"/>
+        <a:font script="Orya" typeface="Kalinga"/>
+        <a:font script="Mlym" typeface="Kartika"/>
+        <a:font script="Laoo" typeface="DokChampa"/>
+        <a:font script="Sinh" typeface="Iskoola Pota"/>
+        <a:font script="Mong" typeface="Mongolian Baiti"/>
+        <a:font script="Viet" typeface="Times New Roman"/>
+        <a:font script="Uigh" typeface="Microsoft Uighur"/>
+        <a:font script="Geor" typeface="Sylfaen"/>
+        <a:font script="Armn" typeface="Arial"/>
+        <a:font script="Bugi" typeface="Leelawadee UI"/>
+        <a:font script="Bopo" typeface="Microsoft JhengHei"/>
+        <a:font script="Java" typeface="Javanese Text"/>
+        <a:font script="Lisu" typeface="Segoe UI"/>
+        <a:font script="Mymr" typeface="Myanmar Text"/>
+        <a:font script="Nkoo" typeface="Ebrima"/>
+        <a:font script="Olck" typeface="Nirmala UI"/>
+        <a:font script="Osma" typeface="Ebrima"/>
+        <a:font script="Phag" typeface="Phagspa"/>
+        <a:font script="Syrn" typeface="Estrangelo Edessa"/>
+        <a:font script="Syrj" typeface="Estrangelo Edessa"/>
+        <a:font script="Syre" typeface="Estrangelo Edessa"/>
+        <a:font script="Sora" typeface="Nirmala UI"/>
+        <a:font script="Tale" typeface="Microsoft Tai Le"/>
+        <a:font script="Talu" typeface="Microsoft New Tai Lue"/>
+        <a:font script="Tfng" typeface="Ebrima"/>
+      </a:majorFont>
+      <a:minorFont>
+        <a:latin typeface="Calibri" panose="020F0502020204030204"/>
+        <a:ea typeface=""/>
+        <a:cs typeface=""/>
+        <a:font script="Jpan" typeface="游ゴシック"/>
+        <a:font script="Hang" typeface="맑은 고딕"/>
+        <a:font script="Hans" typeface="等线"/>
+        <a:font script="Hant" typeface="新細明體"/>
+        <a:font script="Arab" typeface="Arial"/>
+        <a:font script="Hebr" typeface="Arial"/>
+        <a:font script="Thai" typeface="Cordia New"/>
+        <a:font script="Ethi" typeface="Nyala"/>
+        <a:font script="Beng" typeface="Vrinda"/>
+        <a:font script="Gujr" typeface="Shruti"/>
+        <a:font script="Khmr" typeface="DaunPenh"/>
+        <a:font script="Knda" typeface="Tunga"/>
+        <a:font script="Guru" typeface="Raavi"/>
+        <a:font script="Cans" typeface="Euphemia"/>
+        <a:font script="Cher" typeface="Plantagenet Cherokee"/>
+        <a:font script="Yiii" typeface="Microsoft Yi Baiti"/>
+        <a:font script="Tibt" typeface="Microsoft Himalaya"/>
+        <a:font script="Thaa" typeface="MV Boli"/>
+        <a:font script="Deva" typeface="Mangal"/>
+        <a:font script="Telu" typeface="Gautami"/>
+        <a:font script="Taml" typeface="Latha"/>
+        <a:font script="Syrc" typeface="Estrangelo Edessa"/>
+        <a:font script="Orya" typeface="Kalinga"/>
+        <a:font script="Mlym" typeface="Kartika"/>
+        <a:font script="Laoo" typeface="DokChampa"/>
+        <a:font script="Sinh" typeface="Iskoola Pota"/>
+        <a:font script="Mong" typeface="Mongolian Baiti"/>
+        <a:font script="Viet" typeface="Arial"/>
+        <a:font script="Uigh" typeface="Microsoft Uighur"/>
+        <a:font script="Geor" typeface="Sylfaen"/>
+        <a:font script="Armn" typeface="Arial"/>
+        <a:font script="Bugi" typeface="Leelawadee UI"/>
+        <a:font script="Bopo" typeface="Microsoft JhengHei"/>
+        <a:font script="Java" typeface="Javanese Text"/>
+        <a:font script="Lisu" typeface="Segoe UI"/>
+        <a:font script="Mymr" typeface="Myanmar Text"/>
+        <a:font script="Nkoo" typeface="Ebrima"/>
+        <a:font script="Olck" typeface="Nirmala UI"/>
+        <a:font script="Osma" typeface="Ebrima"/>
+        <a:font script="Phag" typeface="Phagspa"/>
+        <a:font script="Syrn" typeface="Estrangelo Edessa"/>
+        <a:font script="Syrj" typeface="Estrangelo Edessa"/>
+        <a:font script="Syre" typeface="Estrangelo Edessa"/>
+        <a:font script="Sora" typeface="Nirmala UI"/>
+        <a:font script="Tale" typeface="Microsoft Tai Le"/>
+        <a:font script="Talu" typeface="Microsoft New Tai Lue"/>
+        <a:font script="Tfng" typeface="Ebrima"/>
+      </a:minorFont>
+    </a:fontScheme>
+    <a:fmtScheme name="Office">
+      <a:fillStyleLst>
+        <a:solidFill>
+          <a:schemeClr val="phClr"/>
+        </a:solidFill>
+        <a:gradFill rotWithShape="1">
+          <a:gsLst>
+            <a:gs pos="0">
+              <a:schemeClr val="phClr">
+                <a:lumMod val="110000"/>
+                <a:satMod val="105000"/>
+                <a:tint val="67000"/>
+              </a:schemeClr>
+            </a:gs>
+            <a:gs pos="50000">
+              <a:schemeClr val="phClr">
+                <a:lumMod val="105000"/>
+                <a:satMod val="103000"/>
+                <a:tint val="73000"/>
+              </a:schemeClr>
+            </a:gs>
+            <a:gs pos="100000">
+              <a:schemeClr val="phClr">
+                <a:lumMod val="105000"/>
+                <a:satMod val="109000"/>
+                <a:tint val="81000"/>
+              </a:schemeClr>
+            </a:gs>
+          </a:gsLst>
+          <a:lin ang="5400000" scaled="0"/>
+        </a:gradFill>
+        <a:gradFill rotWithShape="1">
+          <a:gsLst>
+            <a:gs pos="0">
+              <a:schemeClr val="phClr">
+                <a:satMod val="103000"/>
+                <a:lumMod val="102000"/>
+                <a:tint val="94000"/>
+              </a:schemeClr>
+            </a:gs>
+            <a:gs pos="50000">
+              <a:schemeClr val="phClr">
+                <a:satMod val="110000"/>
+                <a:lumMod val="100000"/>
+                <a:shade val="100000"/>
+              </a:schemeClr>
+            </a:gs>
+            <a:gs pos="100000">
+              <a:schemeClr val="phClr">
+                <a:lumMod val="99000"/>
+                <a:satMod val="120000"/>
+                <a:shade val="78000"/>
+              </a:schemeClr>
+            </a:gs>
+          </a:gsLst>
+          <a:lin ang="5400000" scaled="0"/>
+        </a:gradFill>
+      </a:fillStyleLst>
+      <a:lnStyleLst>
+        <a:ln w="6350" cap="flat" cmpd="sng" algn="ctr">
+          <a:solidFill>
+            <a:schemeClr val="phClr"/>
+          </a:solidFill>
+          <a:prstDash val="solid"/>
+          <a:miter lim="800000"/>
+        </a:ln>
+        <a:ln w="12700" cap="flat" cmpd="sng" algn="ctr">
+          <a:solidFill>
+            <a:schemeClr val="phClr"/>
+          </a:solidFill>
+          <a:prstDash val="solid"/>
+          <a:miter lim="800000"/>
+        </a:ln>
+        <a:ln w="19050" cap="flat" cmpd="sng" algn="ctr">
+          <a:solidFill>
+            <a:schemeClr val="phClr"/>
+          </a:solidFill>
+          <a:prstDash val="solid"/>
+          <a:miter lim="800000"/>
+        </a:ln>
+      </a:lnStyleLst>
+      <a:effectStyleLst>
+        <a:effectStyle>
+          <a:effectLst/>
+        </a:effectStyle>
+        <a:effectStyle>
+          <a:effectLst/>
+        </a:effectStyle>
+        <a:effectStyle>
+          <a:effectLst>
+            <a:outerShdw blurRad="57150" dist="19050" dir="5400000" algn="ctr" rotWithShape="0">
+              <a:srgbClr val="000000">
+                <a:alpha val="63000"/>
+              </a:srgbClr>
+            </a:outerShdw>
+          </a:effectLst>
+        </a:effectStyle>
+      </a:effectStyleLst>
+      <a:bgFillStyleLst>
+        <a:solidFill>
+          <a:schemeClr val="phClr"/>
+        </a:solidFill>
+        <a:solidFill>
+          <a:schemeClr val="phClr">
+            <a:tint val="95000"/>
+            <a:satMod val="170000"/>
+          </a:schemeClr>
+        </a:solidFill>
+        <a:gradFill rotWithShape="1">
+          <a:gsLst>
+            <a:gs pos="0">
+              <a:schemeClr val="phClr">
+                <a:tint val="93000"/>
+                <a:satMod val="150000"/>
+                <a:shade val="98000"/>
+                <a:lumMod val="102000"/>
+              </a:schemeClr>
+            </a:gs>
+            <a:gs pos="50000">
+              <a:schemeClr val="phClr">
+                <a:tint val="98000"/>
+                <a:satMod val="130000"/>
+                <a:shade val="90000"/>
+                <a:lumMod val="103000"/>
+              </a:schemeClr>
+            </a:gs>
+            <a:gs pos="100000">
+              <a:schemeClr val="phClr">
+                <a:shade val="63000"/>
+                <a:satMod val="120000"/>
+              </a:schemeClr>
+            </a:gs>
+          </a:gsLst>
+          <a:lin ang="5400000" scaled="0"/>
+        </a:gradFill>
+      </a:bgFillStyleLst>
+    </a:fmtScheme>
+  </a:themeElements>
+  <a:objectDefaults/>
+  <a:extraClrSchemeLst/>
+  <a:extLst>
+    <a:ext uri="{05A4C25C-085E-4340-85A3-A5531E510DB2}">
+      <thm15:themeFamily xmlns:thm15="http://schemas.microsoft.com/office/thememl/2012/main" name="Office Theme" id="{62F939B6-93AF-4DB8-9C6B-D6C7DFDC589F}" vid="{4A3C46E8-61CC-4603-A589-7422A47A8E4A}"/>
+    </a:ext>
+  </a:extLst>
+</a:theme>
 </file>
</xml_diff>

<commit_message>
update ppt and refactor
</commit_message>
<xml_diff>
--- a/August 2018.pptx
+++ b/August 2018.pptx
@@ -5,15 +5,16 @@
     <p:sldMasterId id="2147483689" r:id="rId1"/>
   </p:sldMasterIdLst>
   <p:notesMasterIdLst>
-    <p:notesMasterId r:id="rId8"/>
+    <p:notesMasterId r:id="rId9"/>
   </p:notesMasterIdLst>
   <p:sldIdLst>
     <p:sldId id="256" r:id="rId2"/>
     <p:sldId id="257" r:id="rId3"/>
-    <p:sldId id="258" r:id="rId4"/>
-    <p:sldId id="259" r:id="rId5"/>
-    <p:sldId id="260" r:id="rId6"/>
-    <p:sldId id="261" r:id="rId7"/>
+    <p:sldId id="262" r:id="rId4"/>
+    <p:sldId id="258" r:id="rId5"/>
+    <p:sldId id="259" r:id="rId6"/>
+    <p:sldId id="260" r:id="rId7"/>
+    <p:sldId id="261" r:id="rId8"/>
   </p:sldIdLst>
   <p:sldSz cx="12192000" cy="6858000"/>
   <p:notesSz cx="6858000" cy="9144000"/>
@@ -537,7 +538,7 @@
           <a:p>
             <a:fld id="{2A82BF32-25B9-4CFB-82AF-946389DD5021}" type="slidenum">
               <a:rPr lang="en-US" smtClean="0"/>
-              <a:t>3</a:t>
+              <a:t>4</a:t>
             </a:fld>
             <a:endParaRPr lang="en-US"/>
           </a:p>
@@ -638,7 +639,7 @@
           <a:p>
             <a:fld id="{2A82BF32-25B9-4CFB-82AF-946389DD5021}" type="slidenum">
               <a:rPr lang="en-US" smtClean="0"/>
-              <a:t>4</a:t>
+              <a:t>5</a:t>
             </a:fld>
             <a:endParaRPr lang="en-US"/>
           </a:p>
@@ -1013,7 +1014,7 @@
           <a:p>
             <a:fld id="{2A82BF32-25B9-4CFB-82AF-946389DD5021}" type="slidenum">
               <a:rPr lang="en-US" smtClean="0"/>
-              <a:t>5</a:t>
+              <a:t>6</a:t>
             </a:fld>
             <a:endParaRPr lang="en-US"/>
           </a:p>
@@ -1114,7 +1115,7 @@
           <a:p>
             <a:fld id="{2A82BF32-25B9-4CFB-82AF-946389DD5021}" type="slidenum">
               <a:rPr lang="en-US" smtClean="0"/>
-              <a:t>6</a:t>
+              <a:t>7</a:t>
             </a:fld>
             <a:endParaRPr lang="en-US"/>
           </a:p>
@@ -4853,14 +4854,7 @@
           <a:p>
             <a:r>
               <a:rPr lang="en-US" dirty="0"/>
-              <a:t>August 2018 </a:t>
-            </a:r>
-            <a:br>
-              <a:rPr lang="en-US" dirty="0"/>
-            </a:br>
-            <a:r>
-              <a:rPr lang="en-US" dirty="0"/>
-              <a:t>Flight Delay Database</a:t>
+              <a:t>Airline On-Time Performance Statistics</a:t>
             </a:r>
           </a:p>
         </p:txBody>
@@ -4975,7 +4969,9 @@
         </p:nvSpPr>
         <p:spPr/>
         <p:txBody>
-          <a:bodyPr/>
+          <a:bodyPr>
+            <a:normAutofit fontScale="85000" lnSpcReduction="20000"/>
+          </a:bodyPr>
           <a:lstStyle/>
           <a:p>
             <a:pPr marL="0" indent="0">
@@ -5068,11 +5064,11 @@
                 <a:ea typeface="Calibri" panose="020F0502020204030204" pitchFamily="34" charset="0"/>
                 <a:cs typeface="Times New Roman" panose="02020603050405020304" pitchFamily="18" charset="0"/>
               </a:rPr>
-              <a:t>Airports – 6,510 rows</a:t>
-            </a:r>
-          </a:p>
-          <a:p>
-            <a:pPr lvl="2">
+              <a:t>Airports – 6,511 rows</a:t>
+            </a:r>
+          </a:p>
+          <a:p>
+            <a:pPr lvl="3">
               <a:buFont typeface="Arial" panose="020B0604020202020204" pitchFamily="34" charset="0"/>
               <a:buChar char="•"/>
             </a:pPr>
@@ -5082,7 +5078,7 @@
                 <a:ea typeface="Calibri" panose="020F0502020204030204" pitchFamily="34" charset="0"/>
                 <a:cs typeface="Times New Roman" panose="02020603050405020304" pitchFamily="18" charset="0"/>
               </a:rPr>
-              <a:t>Air Carriers – 1,655 rows</a:t>
+              <a:t>Airport code and description - </a:t>
             </a:r>
           </a:p>
           <a:p>
@@ -5096,8 +5092,61 @@
                 <a:ea typeface="Calibri" panose="020F0502020204030204" pitchFamily="34" charset="0"/>
                 <a:cs typeface="Times New Roman" panose="02020603050405020304" pitchFamily="18" charset="0"/>
               </a:rPr>
-              <a:t>Flights – 701,351 rows</a:t>
-            </a:r>
+              <a:t>Air Carriers – 1,656 rows</a:t>
+            </a:r>
+          </a:p>
+          <a:p>
+            <a:pPr lvl="3">
+              <a:buFont typeface="Arial" panose="020B0604020202020204" pitchFamily="34" charset="0"/>
+              <a:buChar char="•"/>
+            </a:pPr>
+            <a:r>
+              <a:rPr lang="en-US" kern="100" dirty="0">
+                <a:latin typeface="Calibri" panose="020F0502020204030204" pitchFamily="34" charset="0"/>
+                <a:ea typeface="Calibri" panose="020F0502020204030204" pitchFamily="34" charset="0"/>
+                <a:cs typeface="Times New Roman" panose="02020603050405020304" pitchFamily="18" charset="0"/>
+              </a:rPr>
+              <a:t>Air Carrier Code and description -</a:t>
+            </a:r>
+          </a:p>
+          <a:p>
+            <a:pPr lvl="2">
+              <a:buFont typeface="Arial" panose="020B0604020202020204" pitchFamily="34" charset="0"/>
+              <a:buChar char="•"/>
+            </a:pPr>
+            <a:r>
+              <a:rPr lang="en-US" kern="100" dirty="0">
+                <a:latin typeface="Calibri" panose="020F0502020204030204" pitchFamily="34" charset="0"/>
+                <a:ea typeface="Calibri" panose="020F0502020204030204" pitchFamily="34" charset="0"/>
+                <a:cs typeface="Times New Roman" panose="02020603050405020304" pitchFamily="18" charset="0"/>
+              </a:rPr>
+              <a:t>August 2018 Nationwide – 701,352 rows</a:t>
+            </a:r>
+          </a:p>
+          <a:p>
+            <a:pPr lvl="3">
+              <a:buFont typeface="Arial" panose="020B0604020202020204" pitchFamily="34" charset="0"/>
+              <a:buChar char="•"/>
+            </a:pPr>
+            <a:r>
+              <a:rPr lang="en-US" kern="100" dirty="0">
+                <a:latin typeface="Calibri" panose="020F0502020204030204" pitchFamily="34" charset="0"/>
+                <a:ea typeface="Calibri" panose="020F0502020204030204" pitchFamily="34" charset="0"/>
+                <a:cs typeface="Times New Roman" panose="02020603050405020304" pitchFamily="18" charset="0"/>
+              </a:rPr>
+              <a:t>Flights data with any delays for the month of August 2018</a:t>
+            </a:r>
+          </a:p>
+          <a:p>
+            <a:pPr lvl="3">
+              <a:buFont typeface="Arial" panose="020B0604020202020204" pitchFamily="34" charset="0"/>
+              <a:buChar char="•"/>
+            </a:pPr>
+            <a:endParaRPr lang="en-US" kern="100" dirty="0">
+              <a:latin typeface="Calibri" panose="020F0502020204030204" pitchFamily="34" charset="0"/>
+              <a:ea typeface="Calibri" panose="020F0502020204030204" pitchFamily="34" charset="0"/>
+              <a:cs typeface="Times New Roman" panose="02020603050405020304" pitchFamily="18" charset="0"/>
+            </a:endParaRPr>
           </a:p>
           <a:p>
             <a:pPr lvl="2"/>
@@ -5118,23 +5167,8 @@
                 <a:ea typeface="Calibri" panose="020F0502020204030204" pitchFamily="34" charset="0"/>
                 <a:cs typeface="Times New Roman" panose="02020603050405020304" pitchFamily="18" charset="0"/>
               </a:rPr>
-              <a:t>Some acronyms in </a:t>
-            </a:r>
-            <a:r>
-              <a:rPr lang="en-US" sz="1800" kern="100">
-                <a:effectLst/>
-                <a:latin typeface="Calibri" panose="020F0502020204030204" pitchFamily="34" charset="0"/>
-                <a:ea typeface="Calibri" panose="020F0502020204030204" pitchFamily="34" charset="0"/>
-                <a:cs typeface="Times New Roman" panose="02020603050405020304" pitchFamily="18" charset="0"/>
-              </a:rPr>
-              <a:t>the data:</a:t>
-            </a:r>
-            <a:endParaRPr lang="en-US" sz="1800" kern="100" dirty="0">
-              <a:effectLst/>
-              <a:latin typeface="Calibri" panose="020F0502020204030204" pitchFamily="34" charset="0"/>
-              <a:ea typeface="Calibri" panose="020F0502020204030204" pitchFamily="34" charset="0"/>
-              <a:cs typeface="Times New Roman" panose="02020603050405020304" pitchFamily="18" charset="0"/>
-            </a:endParaRPr>
+              <a:t>Some acronyms in the data:</a:t>
+            </a:r>
           </a:p>
           <a:p>
             <a:pPr>
@@ -5193,6 +5227,96 @@
           </a:p>
         </p:txBody>
       </p:sp>
+      <p:pic>
+        <p:nvPicPr>
+          <p:cNvPr id="4" name="Picture 3">
+            <a:extLst>
+              <a:ext uri="{FF2B5EF4-FFF2-40B4-BE49-F238E27FC236}">
+                <a16:creationId xmlns:a16="http://schemas.microsoft.com/office/drawing/2014/main" id="{60FA8464-00CC-9523-56D3-872E47C3B23B}"/>
+              </a:ext>
+            </a:extLst>
+          </p:cNvPr>
+          <p:cNvPicPr>
+            <a:picLocks noChangeAspect="1"/>
+          </p:cNvPicPr>
+          <p:nvPr/>
+        </p:nvPicPr>
+        <p:blipFill>
+          <a:blip r:embed="rId3"/>
+          <a:stretch>
+            <a:fillRect/>
+          </a:stretch>
+        </p:blipFill>
+        <p:spPr>
+          <a:xfrm>
+            <a:off x="3984210" y="3309921"/>
+            <a:ext cx="4553585" cy="238158"/>
+          </a:xfrm>
+          <a:prstGeom prst="rect">
+            <a:avLst/>
+          </a:prstGeom>
+        </p:spPr>
+      </p:pic>
+      <p:pic>
+        <p:nvPicPr>
+          <p:cNvPr id="5" name="Picture 4">
+            <a:extLst>
+              <a:ext uri="{FF2B5EF4-FFF2-40B4-BE49-F238E27FC236}">
+                <a16:creationId xmlns:a16="http://schemas.microsoft.com/office/drawing/2014/main" id="{28D12FCB-67A3-CFF6-3297-DA8692939C8E}"/>
+              </a:ext>
+            </a:extLst>
+          </p:cNvPr>
+          <p:cNvPicPr>
+            <a:picLocks noChangeAspect="1"/>
+          </p:cNvPicPr>
+          <p:nvPr/>
+        </p:nvPicPr>
+        <p:blipFill>
+          <a:blip r:embed="rId4"/>
+          <a:stretch>
+            <a:fillRect/>
+          </a:stretch>
+        </p:blipFill>
+        <p:spPr>
+          <a:xfrm>
+            <a:off x="4235443" y="3762150"/>
+            <a:ext cx="3019846" cy="190527"/>
+          </a:xfrm>
+          <a:prstGeom prst="rect">
+            <a:avLst/>
+          </a:prstGeom>
+        </p:spPr>
+      </p:pic>
+      <p:pic>
+        <p:nvPicPr>
+          <p:cNvPr id="6" name="Picture 5">
+            <a:extLst>
+              <a:ext uri="{FF2B5EF4-FFF2-40B4-BE49-F238E27FC236}">
+                <a16:creationId xmlns:a16="http://schemas.microsoft.com/office/drawing/2014/main" id="{EB6D0DE1-8B0C-166C-1A2D-9418B0A356CC}"/>
+              </a:ext>
+            </a:extLst>
+          </p:cNvPr>
+          <p:cNvPicPr>
+            <a:picLocks noChangeAspect="1"/>
+          </p:cNvPicPr>
+          <p:nvPr/>
+        </p:nvPicPr>
+        <p:blipFill>
+          <a:blip r:embed="rId5"/>
+          <a:stretch>
+            <a:fillRect/>
+          </a:stretch>
+        </p:blipFill>
+        <p:spPr>
+          <a:xfrm>
+            <a:off x="1890677" y="4323161"/>
+            <a:ext cx="9996524" cy="391816"/>
+          </a:xfrm>
+          <a:prstGeom prst="rect">
+            <a:avLst/>
+          </a:prstGeom>
+        </p:spPr>
+      </p:pic>
     </p:spTree>
     <p:extLst>
       <p:ext uri="{BB962C8B-B14F-4D97-AF65-F5344CB8AC3E}">
@@ -5228,6 +5352,214 @@
           <p:cNvPr id="2" name="Title 1">
             <a:extLst>
               <a:ext uri="{FF2B5EF4-FFF2-40B4-BE49-F238E27FC236}">
+                <a16:creationId xmlns:a16="http://schemas.microsoft.com/office/drawing/2014/main" id="{36EDBB5D-471A-A883-84FA-45B0E3668516}"/>
+              </a:ext>
+            </a:extLst>
+          </p:cNvPr>
+          <p:cNvSpPr>
+            <a:spLocks noGrp="1"/>
+          </p:cNvSpPr>
+          <p:nvPr>
+            <p:ph type="title"/>
+          </p:nvPr>
+        </p:nvSpPr>
+        <p:spPr/>
+        <p:txBody>
+          <a:bodyPr/>
+          <a:lstStyle/>
+          <a:p>
+            <a:r>
+              <a:rPr lang="en-US" dirty="0"/>
+              <a:t>Data Extraction</a:t>
+            </a:r>
+          </a:p>
+        </p:txBody>
+      </p:sp>
+      <p:sp>
+        <p:nvSpPr>
+          <p:cNvPr id="3" name="Content Placeholder 2">
+            <a:extLst>
+              <a:ext uri="{FF2B5EF4-FFF2-40B4-BE49-F238E27FC236}">
+                <a16:creationId xmlns:a16="http://schemas.microsoft.com/office/drawing/2014/main" id="{A86539B5-9B70-F920-A940-30D84477B5E1}"/>
+              </a:ext>
+            </a:extLst>
+          </p:cNvPr>
+          <p:cNvSpPr>
+            <a:spLocks noGrp="1"/>
+          </p:cNvSpPr>
+          <p:nvPr>
+            <p:ph idx="1"/>
+          </p:nvPr>
+        </p:nvSpPr>
+        <p:spPr/>
+        <p:txBody>
+          <a:bodyPr/>
+          <a:lstStyle/>
+          <a:p>
+            <a:r>
+              <a:rPr lang="en-US" dirty="0"/>
+              <a:t>Dataset downloaded from Source is a zip file</a:t>
+            </a:r>
+          </a:p>
+          <a:p>
+            <a:endParaRPr lang="en-US" dirty="0"/>
+          </a:p>
+          <a:p>
+            <a:r>
+              <a:rPr lang="en-US" dirty="0"/>
+              <a:t>Import </a:t>
+            </a:r>
+            <a:r>
+              <a:rPr lang="en-US" b="1" dirty="0" err="1"/>
+              <a:t>zipfile</a:t>
+            </a:r>
+            <a:r>
+              <a:rPr lang="en-US" dirty="0"/>
+              <a:t> - pandas library to extract the zip file and write the contents to a directory			</a:t>
+            </a:r>
+          </a:p>
+          <a:p>
+            <a:pPr marL="0" indent="0">
+              <a:buNone/>
+            </a:pPr>
+            <a:r>
+              <a:rPr lang="en-US" dirty="0"/>
+              <a:t>							Files extracted to Resources folder</a:t>
+            </a:r>
+          </a:p>
+        </p:txBody>
+      </p:sp>
+      <p:pic>
+        <p:nvPicPr>
+          <p:cNvPr id="4" name="Picture 3">
+            <a:extLst>
+              <a:ext uri="{FF2B5EF4-FFF2-40B4-BE49-F238E27FC236}">
+                <a16:creationId xmlns:a16="http://schemas.microsoft.com/office/drawing/2014/main" id="{DFC7F7F0-DFF2-4BB7-D6D1-8215B7B9EEFF}"/>
+              </a:ext>
+            </a:extLst>
+          </p:cNvPr>
+          <p:cNvPicPr>
+            <a:picLocks noChangeAspect="1"/>
+          </p:cNvPicPr>
+          <p:nvPr/>
+        </p:nvPicPr>
+        <p:blipFill>
+          <a:blip r:embed="rId2"/>
+          <a:stretch>
+            <a:fillRect/>
+          </a:stretch>
+        </p:blipFill>
+        <p:spPr>
+          <a:xfrm>
+            <a:off x="1496957" y="2319354"/>
+            <a:ext cx="7030431" cy="266737"/>
+          </a:xfrm>
+          <a:prstGeom prst="rect">
+            <a:avLst/>
+          </a:prstGeom>
+        </p:spPr>
+      </p:pic>
+      <p:pic>
+        <p:nvPicPr>
+          <p:cNvPr id="5" name="Picture 4">
+            <a:extLst>
+              <a:ext uri="{FF2B5EF4-FFF2-40B4-BE49-F238E27FC236}">
+                <a16:creationId xmlns:a16="http://schemas.microsoft.com/office/drawing/2014/main" id="{57EEDD73-FACA-2F78-7BD2-50A93A2AC2C3}"/>
+              </a:ext>
+            </a:extLst>
+          </p:cNvPr>
+          <p:cNvPicPr>
+            <a:picLocks noChangeAspect="1"/>
+          </p:cNvPicPr>
+          <p:nvPr/>
+        </p:nvPicPr>
+        <p:blipFill>
+          <a:blip r:embed="rId3"/>
+          <a:stretch>
+            <a:fillRect/>
+          </a:stretch>
+        </p:blipFill>
+        <p:spPr>
+          <a:xfrm>
+            <a:off x="1256325" y="3352441"/>
+            <a:ext cx="5524628" cy="2456254"/>
+          </a:xfrm>
+          <a:prstGeom prst="rect">
+            <a:avLst/>
+          </a:prstGeom>
+        </p:spPr>
+      </p:pic>
+      <p:pic>
+        <p:nvPicPr>
+          <p:cNvPr id="6" name="Picture 5" descr="A screenshot of a computer&#10;&#10;Description automatically generated">
+            <a:extLst>
+              <a:ext uri="{FF2B5EF4-FFF2-40B4-BE49-F238E27FC236}">
+                <a16:creationId xmlns:a16="http://schemas.microsoft.com/office/drawing/2014/main" id="{7261060A-9A7C-D2F0-A08C-8AB9BE0C8784}"/>
+              </a:ext>
+            </a:extLst>
+          </p:cNvPr>
+          <p:cNvPicPr>
+            <a:picLocks noChangeAspect="1"/>
+          </p:cNvPicPr>
+          <p:nvPr/>
+        </p:nvPicPr>
+        <p:blipFill>
+          <a:blip r:embed="rId4">
+            <a:extLst>
+              <a:ext uri="{28A0092B-C50C-407E-A947-70E740481C1C}">
+                <a14:useLocalDpi xmlns:a14="http://schemas.microsoft.com/office/drawing/2010/main" val="0"/>
+              </a:ext>
+            </a:extLst>
+          </a:blip>
+          <a:stretch>
+            <a:fillRect/>
+          </a:stretch>
+        </p:blipFill>
+        <p:spPr>
+          <a:xfrm>
+            <a:off x="7524498" y="3855189"/>
+            <a:ext cx="4336132" cy="1450757"/>
+          </a:xfrm>
+          <a:prstGeom prst="rect">
+            <a:avLst/>
+          </a:prstGeom>
+        </p:spPr>
+      </p:pic>
+    </p:spTree>
+    <p:extLst>
+      <p:ext uri="{BB962C8B-B14F-4D97-AF65-F5344CB8AC3E}">
+        <p14:creationId xmlns:p14="http://schemas.microsoft.com/office/powerpoint/2010/main" val="1236819365"/>
+      </p:ext>
+    </p:extLst>
+  </p:cSld>
+  <p:clrMapOvr>
+    <a:masterClrMapping/>
+  </p:clrMapOvr>
+</p:sld>
+</file>
+
+<file path=ppt/slides/slide4.xml><?xml version="1.0" encoding="utf-8"?>
+<p:sld xmlns:a="http://schemas.openxmlformats.org/drawingml/2006/main" xmlns:r="http://schemas.openxmlformats.org/officeDocument/2006/relationships" xmlns:p="http://schemas.openxmlformats.org/presentationml/2006/main">
+  <p:cSld>
+    <p:spTree>
+      <p:nvGrpSpPr>
+        <p:cNvPr id="1" name=""/>
+        <p:cNvGrpSpPr/>
+        <p:nvPr/>
+      </p:nvGrpSpPr>
+      <p:grpSpPr>
+        <a:xfrm>
+          <a:off x="0" y="0"/>
+          <a:ext cx="0" cy="0"/>
+          <a:chOff x="0" y="0"/>
+          <a:chExt cx="0" cy="0"/>
+        </a:xfrm>
+      </p:grpSpPr>
+      <p:sp>
+        <p:nvSpPr>
+          <p:cNvPr id="2" name="Title 1">
+            <a:extLst>
+              <a:ext uri="{FF2B5EF4-FFF2-40B4-BE49-F238E27FC236}">
                 <a16:creationId xmlns:a16="http://schemas.microsoft.com/office/drawing/2014/main" id="{F921C890-7872-4834-0752-E269FFC26058}"/>
               </a:ext>
             </a:extLst>
@@ -5322,7 +5654,7 @@
 </p:sld>
 </file>
 
-<file path=ppt/slides/slide4.xml><?xml version="1.0" encoding="utf-8"?>
+<file path=ppt/slides/slide5.xml><?xml version="1.0" encoding="utf-8"?>
 <p:sld xmlns:a="http://schemas.openxmlformats.org/drawingml/2006/main" xmlns:r="http://schemas.openxmlformats.org/officeDocument/2006/relationships" xmlns:p="http://schemas.openxmlformats.org/presentationml/2006/main">
   <p:cSld>
     <p:spTree>
@@ -5476,7 +5808,7 @@
 </p:sld>
 </file>
 
-<file path=ppt/slides/slide5.xml><?xml version="1.0" encoding="utf-8"?>
+<file path=ppt/slides/slide6.xml><?xml version="1.0" encoding="utf-8"?>
 <p:sld xmlns:a="http://schemas.openxmlformats.org/drawingml/2006/main" xmlns:r="http://schemas.openxmlformats.org/officeDocument/2006/relationships" xmlns:p="http://schemas.openxmlformats.org/presentationml/2006/main">
   <p:cSld>
     <p:spTree>
@@ -5600,7 +5932,7 @@
 </p:sld>
 </file>
 
-<file path=ppt/slides/slide6.xml><?xml version="1.0" encoding="utf-8"?>
+<file path=ppt/slides/slide7.xml><?xml version="1.0" encoding="utf-8"?>
 <p:sld xmlns:a="http://schemas.openxmlformats.org/drawingml/2006/main" xmlns:r="http://schemas.openxmlformats.org/officeDocument/2006/relationships" xmlns:p="http://schemas.openxmlformats.org/presentationml/2006/main">
   <p:cSld>
     <p:spTree>

</xml_diff>